<commit_message>
fix release date; update figures
</commit_message>
<xml_diff>
--- a/development/images/dataHierarchy.pptx
+++ b/development/images/dataHierarchy.pptx
@@ -5,13 +5,13 @@
     <p:sldMasterId id="2147483648" r:id="rId1"/>
   </p:sldMasterIdLst>
   <p:sldIdLst>
-    <p:sldId id="257" r:id="rId2"/>
+    <p:sldId id="256" r:id="rId2"/>
   </p:sldIdLst>
   <p:sldSz cx="12192000" cy="6858000"/>
   <p:notesSz cx="6858000" cy="9144000"/>
   <p:defaultTextStyle>
     <a:defPPr>
-      <a:defRPr lang="en-US"/>
+      <a:defRPr lang="de-DE"/>
     </a:defPPr>
     <a:lvl1pPr marL="0" algn="l" defTabSz="914400" rtl="0" eaLnBrk="1" latinLnBrk="0" hangingPunct="1">
       <a:defRPr sz="1800" kern="1200">
@@ -134,7 +134,7 @@
           <p:cNvPr id="2" name="Titel 1">
             <a:extLst>
               <a:ext uri="{FF2B5EF4-FFF2-40B4-BE49-F238E27FC236}">
-                <a16:creationId xmlns:a16="http://schemas.microsoft.com/office/drawing/2014/main" id="{E13AC6CC-1E6A-4CC0-967B-D27F273AB4B8}"/>
+                <a16:creationId xmlns:a16="http://schemas.microsoft.com/office/drawing/2014/main" id="{083E5C88-875C-4B1C-9B3C-B4C702F25456}"/>
               </a:ext>
             </a:extLst>
           </p:cNvPr>
@@ -163,7 +163,6 @@
               <a:rPr lang="de-DE"/>
               <a:t>Mastertitelformat bearbeiten</a:t>
             </a:r>
-            <a:endParaRPr lang="en-US"/>
           </a:p>
         </p:txBody>
       </p:sp>
@@ -172,7 +171,7 @@
           <p:cNvPr id="3" name="Untertitel 2">
             <a:extLst>
               <a:ext uri="{FF2B5EF4-FFF2-40B4-BE49-F238E27FC236}">
-                <a16:creationId xmlns:a16="http://schemas.microsoft.com/office/drawing/2014/main" id="{CFB20ED6-FB1E-45D8-A386-41C693C8A6FC}"/>
+                <a16:creationId xmlns:a16="http://schemas.microsoft.com/office/drawing/2014/main" id="{D4D270B9-5349-42EA-A91C-3E262EF54E0E}"/>
               </a:ext>
             </a:extLst>
           </p:cNvPr>
@@ -234,7 +233,6 @@
               <a:rPr lang="de-DE"/>
               <a:t>Master-Untertitelformat bearbeiten</a:t>
             </a:r>
-            <a:endParaRPr lang="en-US"/>
           </a:p>
         </p:txBody>
       </p:sp>
@@ -243,7 +241,7 @@
           <p:cNvPr id="4" name="Datumsplatzhalter 3">
             <a:extLst>
               <a:ext uri="{FF2B5EF4-FFF2-40B4-BE49-F238E27FC236}">
-                <a16:creationId xmlns:a16="http://schemas.microsoft.com/office/drawing/2014/main" id="{90BD06CE-35EB-4046-B496-550813A7DCE3}"/>
+                <a16:creationId xmlns:a16="http://schemas.microsoft.com/office/drawing/2014/main" id="{1B0D0FC3-707A-4BD4-A22C-A724D8A31589}"/>
               </a:ext>
             </a:extLst>
           </p:cNvPr>
@@ -259,11 +257,11 @@
           <a:bodyPr/>
           <a:lstStyle/>
           <a:p>
-            <a:fld id="{B81DB0FC-38F9-4B57-800B-F8279C774594}" type="datetimeFigureOut">
-              <a:rPr lang="en-US" smtClean="0"/>
-              <a:t>6/2/2021</a:t>
+            <a:fld id="{A0C1EF5A-6466-4AAF-9EAB-79C396D6076C}" type="datetimeFigureOut">
+              <a:rPr lang="de-DE" smtClean="0"/>
+              <a:t>20.04.2022</a:t>
             </a:fld>
-            <a:endParaRPr lang="en-US"/>
+            <a:endParaRPr lang="de-DE"/>
           </a:p>
         </p:txBody>
       </p:sp>
@@ -272,7 +270,7 @@
           <p:cNvPr id="5" name="Fußzeilenplatzhalter 4">
             <a:extLst>
               <a:ext uri="{FF2B5EF4-FFF2-40B4-BE49-F238E27FC236}">
-                <a16:creationId xmlns:a16="http://schemas.microsoft.com/office/drawing/2014/main" id="{8A7EEBA6-EE74-4DC9-970F-D681C0AA25B4}"/>
+                <a16:creationId xmlns:a16="http://schemas.microsoft.com/office/drawing/2014/main" id="{9D3715FA-C5CA-4B83-9315-9A49D973E62F}"/>
               </a:ext>
             </a:extLst>
           </p:cNvPr>
@@ -288,7 +286,7 @@
           <a:bodyPr/>
           <a:lstStyle/>
           <a:p>
-            <a:endParaRPr lang="en-US"/>
+            <a:endParaRPr lang="de-DE"/>
           </a:p>
         </p:txBody>
       </p:sp>
@@ -297,7 +295,7 @@
           <p:cNvPr id="6" name="Foliennummernplatzhalter 5">
             <a:extLst>
               <a:ext uri="{FF2B5EF4-FFF2-40B4-BE49-F238E27FC236}">
-                <a16:creationId xmlns:a16="http://schemas.microsoft.com/office/drawing/2014/main" id="{A094C467-7B3B-48EB-8D86-43BA4FF8A932}"/>
+                <a16:creationId xmlns:a16="http://schemas.microsoft.com/office/drawing/2014/main" id="{CDC2D94A-3D82-437A-BF2E-8D9B9A13BC72}"/>
               </a:ext>
             </a:extLst>
           </p:cNvPr>
@@ -313,18 +311,18 @@
           <a:bodyPr/>
           <a:lstStyle/>
           <a:p>
-            <a:fld id="{7C276BE0-062B-4BA0-AAE5-1A8DABE9CE8D}" type="slidenum">
-              <a:rPr lang="en-US" smtClean="0"/>
+            <a:fld id="{F1B9DB0B-2465-48F5-8C3B-03E86B7C345B}" type="slidenum">
+              <a:rPr lang="de-DE" smtClean="0"/>
               <a:t>‹Nr.›</a:t>
             </a:fld>
-            <a:endParaRPr lang="en-US"/>
+            <a:endParaRPr lang="de-DE"/>
           </a:p>
         </p:txBody>
       </p:sp>
     </p:spTree>
     <p:extLst>
       <p:ext uri="{BB962C8B-B14F-4D97-AF65-F5344CB8AC3E}">
-        <p14:creationId xmlns:p14="http://schemas.microsoft.com/office/powerpoint/2010/main" val="3930944567"/>
+        <p14:creationId xmlns:p14="http://schemas.microsoft.com/office/powerpoint/2010/main" val="3982812378"/>
       </p:ext>
     </p:extLst>
   </p:cSld>
@@ -356,7 +354,7 @@
           <p:cNvPr id="2" name="Titel 1">
             <a:extLst>
               <a:ext uri="{FF2B5EF4-FFF2-40B4-BE49-F238E27FC236}">
-                <a16:creationId xmlns:a16="http://schemas.microsoft.com/office/drawing/2014/main" id="{AE74276B-FA6B-4DBB-836C-C6FF2B10BA9B}"/>
+                <a16:creationId xmlns:a16="http://schemas.microsoft.com/office/drawing/2014/main" id="{AEB3A8F8-958E-48BB-BC61-F6EA0940F1A9}"/>
               </a:ext>
             </a:extLst>
           </p:cNvPr>
@@ -376,7 +374,6 @@
               <a:rPr lang="de-DE"/>
               <a:t>Mastertitelformat bearbeiten</a:t>
             </a:r>
-            <a:endParaRPr lang="en-US"/>
           </a:p>
         </p:txBody>
       </p:sp>
@@ -385,7 +382,7 @@
           <p:cNvPr id="3" name="Vertikaler Textplatzhalter 2">
             <a:extLst>
               <a:ext uri="{FF2B5EF4-FFF2-40B4-BE49-F238E27FC236}">
-                <a16:creationId xmlns:a16="http://schemas.microsoft.com/office/drawing/2014/main" id="{635174D0-CE9E-4C00-8381-359EC132EBAE}"/>
+                <a16:creationId xmlns:a16="http://schemas.microsoft.com/office/drawing/2014/main" id="{C7F274FB-49F6-4E3F-9EA0-AEC31BA4FB07}"/>
               </a:ext>
             </a:extLst>
           </p:cNvPr>
@@ -434,7 +431,6 @@
               <a:rPr lang="de-DE"/>
               <a:t>Fünfte Ebene</a:t>
             </a:r>
-            <a:endParaRPr lang="en-US"/>
           </a:p>
         </p:txBody>
       </p:sp>
@@ -443,7 +439,7 @@
           <p:cNvPr id="4" name="Datumsplatzhalter 3">
             <a:extLst>
               <a:ext uri="{FF2B5EF4-FFF2-40B4-BE49-F238E27FC236}">
-                <a16:creationId xmlns:a16="http://schemas.microsoft.com/office/drawing/2014/main" id="{E7AD3E1B-4B7F-4DAC-85BB-7A7D97F2DF6E}"/>
+                <a16:creationId xmlns:a16="http://schemas.microsoft.com/office/drawing/2014/main" id="{40227CB6-1330-4AA7-97DF-FAC2FB7B1440}"/>
               </a:ext>
             </a:extLst>
           </p:cNvPr>
@@ -459,11 +455,11 @@
           <a:bodyPr/>
           <a:lstStyle/>
           <a:p>
-            <a:fld id="{B81DB0FC-38F9-4B57-800B-F8279C774594}" type="datetimeFigureOut">
-              <a:rPr lang="en-US" smtClean="0"/>
-              <a:t>6/2/2021</a:t>
+            <a:fld id="{A0C1EF5A-6466-4AAF-9EAB-79C396D6076C}" type="datetimeFigureOut">
+              <a:rPr lang="de-DE" smtClean="0"/>
+              <a:t>20.04.2022</a:t>
             </a:fld>
-            <a:endParaRPr lang="en-US"/>
+            <a:endParaRPr lang="de-DE"/>
           </a:p>
         </p:txBody>
       </p:sp>
@@ -472,7 +468,7 @@
           <p:cNvPr id="5" name="Fußzeilenplatzhalter 4">
             <a:extLst>
               <a:ext uri="{FF2B5EF4-FFF2-40B4-BE49-F238E27FC236}">
-                <a16:creationId xmlns:a16="http://schemas.microsoft.com/office/drawing/2014/main" id="{5E82563E-FE23-4623-805C-9032F4DE789D}"/>
+                <a16:creationId xmlns:a16="http://schemas.microsoft.com/office/drawing/2014/main" id="{2A531AD7-4FD3-4BB2-8E58-F43A82C06BC2}"/>
               </a:ext>
             </a:extLst>
           </p:cNvPr>
@@ -488,7 +484,7 @@
           <a:bodyPr/>
           <a:lstStyle/>
           <a:p>
-            <a:endParaRPr lang="en-US"/>
+            <a:endParaRPr lang="de-DE"/>
           </a:p>
         </p:txBody>
       </p:sp>
@@ -497,7 +493,7 @@
           <p:cNvPr id="6" name="Foliennummernplatzhalter 5">
             <a:extLst>
               <a:ext uri="{FF2B5EF4-FFF2-40B4-BE49-F238E27FC236}">
-                <a16:creationId xmlns:a16="http://schemas.microsoft.com/office/drawing/2014/main" id="{ECC21A21-25F2-4A85-9F41-DD669CA4D1E1}"/>
+                <a16:creationId xmlns:a16="http://schemas.microsoft.com/office/drawing/2014/main" id="{92031906-7EAA-4153-82D3-83D26B133ADC}"/>
               </a:ext>
             </a:extLst>
           </p:cNvPr>
@@ -513,18 +509,18 @@
           <a:bodyPr/>
           <a:lstStyle/>
           <a:p>
-            <a:fld id="{7C276BE0-062B-4BA0-AAE5-1A8DABE9CE8D}" type="slidenum">
-              <a:rPr lang="en-US" smtClean="0"/>
+            <a:fld id="{F1B9DB0B-2465-48F5-8C3B-03E86B7C345B}" type="slidenum">
+              <a:rPr lang="de-DE" smtClean="0"/>
               <a:t>‹Nr.›</a:t>
             </a:fld>
-            <a:endParaRPr lang="en-US"/>
+            <a:endParaRPr lang="de-DE"/>
           </a:p>
         </p:txBody>
       </p:sp>
     </p:spTree>
     <p:extLst>
       <p:ext uri="{BB962C8B-B14F-4D97-AF65-F5344CB8AC3E}">
-        <p14:creationId xmlns:p14="http://schemas.microsoft.com/office/powerpoint/2010/main" val="2829206059"/>
+        <p14:creationId xmlns:p14="http://schemas.microsoft.com/office/powerpoint/2010/main" val="907923395"/>
       </p:ext>
     </p:extLst>
   </p:cSld>
@@ -556,7 +552,7 @@
           <p:cNvPr id="2" name="Vertikaler Titel 1">
             <a:extLst>
               <a:ext uri="{FF2B5EF4-FFF2-40B4-BE49-F238E27FC236}">
-                <a16:creationId xmlns:a16="http://schemas.microsoft.com/office/drawing/2014/main" id="{F76D7D52-C01C-41EF-A14D-F87F9CA2F433}"/>
+                <a16:creationId xmlns:a16="http://schemas.microsoft.com/office/drawing/2014/main" id="{CDB2E5F2-15FC-45B2-A29A-5B2AED9621E5}"/>
               </a:ext>
             </a:extLst>
           </p:cNvPr>
@@ -581,7 +577,6 @@
               <a:rPr lang="de-DE"/>
               <a:t>Mastertitelformat bearbeiten</a:t>
             </a:r>
-            <a:endParaRPr lang="en-US"/>
           </a:p>
         </p:txBody>
       </p:sp>
@@ -590,7 +585,7 @@
           <p:cNvPr id="3" name="Vertikaler Textplatzhalter 2">
             <a:extLst>
               <a:ext uri="{FF2B5EF4-FFF2-40B4-BE49-F238E27FC236}">
-                <a16:creationId xmlns:a16="http://schemas.microsoft.com/office/drawing/2014/main" id="{0E2777B6-4691-4C99-A8C1-527FDC440FCC}"/>
+                <a16:creationId xmlns:a16="http://schemas.microsoft.com/office/drawing/2014/main" id="{647594CC-F288-4FAE-8D52-02F3929AB08A}"/>
               </a:ext>
             </a:extLst>
           </p:cNvPr>
@@ -644,7 +639,6 @@
               <a:rPr lang="de-DE"/>
               <a:t>Fünfte Ebene</a:t>
             </a:r>
-            <a:endParaRPr lang="en-US"/>
           </a:p>
         </p:txBody>
       </p:sp>
@@ -653,7 +647,7 @@
           <p:cNvPr id="4" name="Datumsplatzhalter 3">
             <a:extLst>
               <a:ext uri="{FF2B5EF4-FFF2-40B4-BE49-F238E27FC236}">
-                <a16:creationId xmlns:a16="http://schemas.microsoft.com/office/drawing/2014/main" id="{AEE8591D-D870-4220-803F-1BFE9D53CABF}"/>
+                <a16:creationId xmlns:a16="http://schemas.microsoft.com/office/drawing/2014/main" id="{B05211A7-C062-4F90-940A-1FA21CA754B5}"/>
               </a:ext>
             </a:extLst>
           </p:cNvPr>
@@ -669,11 +663,11 @@
           <a:bodyPr/>
           <a:lstStyle/>
           <a:p>
-            <a:fld id="{B81DB0FC-38F9-4B57-800B-F8279C774594}" type="datetimeFigureOut">
-              <a:rPr lang="en-US" smtClean="0"/>
-              <a:t>6/2/2021</a:t>
+            <a:fld id="{A0C1EF5A-6466-4AAF-9EAB-79C396D6076C}" type="datetimeFigureOut">
+              <a:rPr lang="de-DE" smtClean="0"/>
+              <a:t>20.04.2022</a:t>
             </a:fld>
-            <a:endParaRPr lang="en-US"/>
+            <a:endParaRPr lang="de-DE"/>
           </a:p>
         </p:txBody>
       </p:sp>
@@ -682,7 +676,7 @@
           <p:cNvPr id="5" name="Fußzeilenplatzhalter 4">
             <a:extLst>
               <a:ext uri="{FF2B5EF4-FFF2-40B4-BE49-F238E27FC236}">
-                <a16:creationId xmlns:a16="http://schemas.microsoft.com/office/drawing/2014/main" id="{F110742C-09A3-410A-BBFA-46D2AA687587}"/>
+                <a16:creationId xmlns:a16="http://schemas.microsoft.com/office/drawing/2014/main" id="{F84B395E-B47A-4000-930D-5169B1D67DAC}"/>
               </a:ext>
             </a:extLst>
           </p:cNvPr>
@@ -698,7 +692,7 @@
           <a:bodyPr/>
           <a:lstStyle/>
           <a:p>
-            <a:endParaRPr lang="en-US"/>
+            <a:endParaRPr lang="de-DE"/>
           </a:p>
         </p:txBody>
       </p:sp>
@@ -707,7 +701,7 @@
           <p:cNvPr id="6" name="Foliennummernplatzhalter 5">
             <a:extLst>
               <a:ext uri="{FF2B5EF4-FFF2-40B4-BE49-F238E27FC236}">
-                <a16:creationId xmlns:a16="http://schemas.microsoft.com/office/drawing/2014/main" id="{F0F5221B-051C-4CA1-9D9A-2061700B001C}"/>
+                <a16:creationId xmlns:a16="http://schemas.microsoft.com/office/drawing/2014/main" id="{FB63F99C-B02D-40A7-AD17-C8B713BE34E7}"/>
               </a:ext>
             </a:extLst>
           </p:cNvPr>
@@ -723,18 +717,18 @@
           <a:bodyPr/>
           <a:lstStyle/>
           <a:p>
-            <a:fld id="{7C276BE0-062B-4BA0-AAE5-1A8DABE9CE8D}" type="slidenum">
-              <a:rPr lang="en-US" smtClean="0"/>
+            <a:fld id="{F1B9DB0B-2465-48F5-8C3B-03E86B7C345B}" type="slidenum">
+              <a:rPr lang="de-DE" smtClean="0"/>
               <a:t>‹Nr.›</a:t>
             </a:fld>
-            <a:endParaRPr lang="en-US"/>
+            <a:endParaRPr lang="de-DE"/>
           </a:p>
         </p:txBody>
       </p:sp>
     </p:spTree>
     <p:extLst>
       <p:ext uri="{BB962C8B-B14F-4D97-AF65-F5344CB8AC3E}">
-        <p14:creationId xmlns:p14="http://schemas.microsoft.com/office/powerpoint/2010/main" val="3955923639"/>
+        <p14:creationId xmlns:p14="http://schemas.microsoft.com/office/powerpoint/2010/main" val="1493960030"/>
       </p:ext>
     </p:extLst>
   </p:cSld>
@@ -766,7 +760,7 @@
           <p:cNvPr id="2" name="Titel 1">
             <a:extLst>
               <a:ext uri="{FF2B5EF4-FFF2-40B4-BE49-F238E27FC236}">
-                <a16:creationId xmlns:a16="http://schemas.microsoft.com/office/drawing/2014/main" id="{8452C445-66EB-4D55-BE44-0386767EDF62}"/>
+                <a16:creationId xmlns:a16="http://schemas.microsoft.com/office/drawing/2014/main" id="{032298F4-915D-44BA-B9C7-EDDC13640B62}"/>
               </a:ext>
             </a:extLst>
           </p:cNvPr>
@@ -786,7 +780,6 @@
               <a:rPr lang="de-DE"/>
               <a:t>Mastertitelformat bearbeiten</a:t>
             </a:r>
-            <a:endParaRPr lang="en-US"/>
           </a:p>
         </p:txBody>
       </p:sp>
@@ -795,7 +788,7 @@
           <p:cNvPr id="3" name="Inhaltsplatzhalter 2">
             <a:extLst>
               <a:ext uri="{FF2B5EF4-FFF2-40B4-BE49-F238E27FC236}">
-                <a16:creationId xmlns:a16="http://schemas.microsoft.com/office/drawing/2014/main" id="{E3B82AB7-5555-4175-AC92-B278C527C66C}"/>
+                <a16:creationId xmlns:a16="http://schemas.microsoft.com/office/drawing/2014/main" id="{A48E4507-B2E9-4891-A712-29695EF6F493}"/>
               </a:ext>
             </a:extLst>
           </p:cNvPr>
@@ -844,7 +837,6 @@
               <a:rPr lang="de-DE"/>
               <a:t>Fünfte Ebene</a:t>
             </a:r>
-            <a:endParaRPr lang="en-US"/>
           </a:p>
         </p:txBody>
       </p:sp>
@@ -853,7 +845,7 @@
           <p:cNvPr id="4" name="Datumsplatzhalter 3">
             <a:extLst>
               <a:ext uri="{FF2B5EF4-FFF2-40B4-BE49-F238E27FC236}">
-                <a16:creationId xmlns:a16="http://schemas.microsoft.com/office/drawing/2014/main" id="{09B02472-36D2-4411-8130-25BB906DE7F3}"/>
+                <a16:creationId xmlns:a16="http://schemas.microsoft.com/office/drawing/2014/main" id="{923EC29B-C49F-4AAB-9474-A08A151DCA9B}"/>
               </a:ext>
             </a:extLst>
           </p:cNvPr>
@@ -869,11 +861,11 @@
           <a:bodyPr/>
           <a:lstStyle/>
           <a:p>
-            <a:fld id="{B81DB0FC-38F9-4B57-800B-F8279C774594}" type="datetimeFigureOut">
-              <a:rPr lang="en-US" smtClean="0"/>
-              <a:t>6/2/2021</a:t>
+            <a:fld id="{A0C1EF5A-6466-4AAF-9EAB-79C396D6076C}" type="datetimeFigureOut">
+              <a:rPr lang="de-DE" smtClean="0"/>
+              <a:t>20.04.2022</a:t>
             </a:fld>
-            <a:endParaRPr lang="en-US"/>
+            <a:endParaRPr lang="de-DE"/>
           </a:p>
         </p:txBody>
       </p:sp>
@@ -882,7 +874,7 @@
           <p:cNvPr id="5" name="Fußzeilenplatzhalter 4">
             <a:extLst>
               <a:ext uri="{FF2B5EF4-FFF2-40B4-BE49-F238E27FC236}">
-                <a16:creationId xmlns:a16="http://schemas.microsoft.com/office/drawing/2014/main" id="{6695A1FE-DE25-4564-9FC1-B6B5A8A730F2}"/>
+                <a16:creationId xmlns:a16="http://schemas.microsoft.com/office/drawing/2014/main" id="{4562E2F1-21EE-4628-84F7-143767B3B8EE}"/>
               </a:ext>
             </a:extLst>
           </p:cNvPr>
@@ -898,7 +890,7 @@
           <a:bodyPr/>
           <a:lstStyle/>
           <a:p>
-            <a:endParaRPr lang="en-US"/>
+            <a:endParaRPr lang="de-DE"/>
           </a:p>
         </p:txBody>
       </p:sp>
@@ -907,7 +899,7 @@
           <p:cNvPr id="6" name="Foliennummernplatzhalter 5">
             <a:extLst>
               <a:ext uri="{FF2B5EF4-FFF2-40B4-BE49-F238E27FC236}">
-                <a16:creationId xmlns:a16="http://schemas.microsoft.com/office/drawing/2014/main" id="{F6CE163F-F40D-411A-9FCC-CDAE3C2074CF}"/>
+                <a16:creationId xmlns:a16="http://schemas.microsoft.com/office/drawing/2014/main" id="{CA476B24-822D-4148-ABBC-0A0AA6830D46}"/>
               </a:ext>
             </a:extLst>
           </p:cNvPr>
@@ -923,18 +915,18 @@
           <a:bodyPr/>
           <a:lstStyle/>
           <a:p>
-            <a:fld id="{7C276BE0-062B-4BA0-AAE5-1A8DABE9CE8D}" type="slidenum">
-              <a:rPr lang="en-US" smtClean="0"/>
+            <a:fld id="{F1B9DB0B-2465-48F5-8C3B-03E86B7C345B}" type="slidenum">
+              <a:rPr lang="de-DE" smtClean="0"/>
               <a:t>‹Nr.›</a:t>
             </a:fld>
-            <a:endParaRPr lang="en-US"/>
+            <a:endParaRPr lang="de-DE"/>
           </a:p>
         </p:txBody>
       </p:sp>
     </p:spTree>
     <p:extLst>
       <p:ext uri="{BB962C8B-B14F-4D97-AF65-F5344CB8AC3E}">
-        <p14:creationId xmlns:p14="http://schemas.microsoft.com/office/powerpoint/2010/main" val="1612654625"/>
+        <p14:creationId xmlns:p14="http://schemas.microsoft.com/office/powerpoint/2010/main" val="330198632"/>
       </p:ext>
     </p:extLst>
   </p:cSld>
@@ -966,7 +958,7 @@
           <p:cNvPr id="2" name="Titel 1">
             <a:extLst>
               <a:ext uri="{FF2B5EF4-FFF2-40B4-BE49-F238E27FC236}">
-                <a16:creationId xmlns:a16="http://schemas.microsoft.com/office/drawing/2014/main" id="{4714678A-97C0-41D9-9EF9-31E7F9AC357A}"/>
+                <a16:creationId xmlns:a16="http://schemas.microsoft.com/office/drawing/2014/main" id="{D2D03D13-0628-4FDE-B74E-81B90FA9D425}"/>
               </a:ext>
             </a:extLst>
           </p:cNvPr>
@@ -995,7 +987,6 @@
               <a:rPr lang="de-DE"/>
               <a:t>Mastertitelformat bearbeiten</a:t>
             </a:r>
-            <a:endParaRPr lang="en-US"/>
           </a:p>
         </p:txBody>
       </p:sp>
@@ -1004,7 +995,7 @@
           <p:cNvPr id="3" name="Textplatzhalter 2">
             <a:extLst>
               <a:ext uri="{FF2B5EF4-FFF2-40B4-BE49-F238E27FC236}">
-                <a16:creationId xmlns:a16="http://schemas.microsoft.com/office/drawing/2014/main" id="{061492B8-AA17-42FA-BE9C-2C107CD79DE3}"/>
+                <a16:creationId xmlns:a16="http://schemas.microsoft.com/office/drawing/2014/main" id="{A1AE755B-338B-44DD-B176-94C8D68FF1D2}"/>
               </a:ext>
             </a:extLst>
           </p:cNvPr>
@@ -1129,7 +1120,7 @@
           <p:cNvPr id="4" name="Datumsplatzhalter 3">
             <a:extLst>
               <a:ext uri="{FF2B5EF4-FFF2-40B4-BE49-F238E27FC236}">
-                <a16:creationId xmlns:a16="http://schemas.microsoft.com/office/drawing/2014/main" id="{1C334A24-6EAE-4047-904B-29DEE885F74C}"/>
+                <a16:creationId xmlns:a16="http://schemas.microsoft.com/office/drawing/2014/main" id="{71B68327-1905-4C7E-9059-69E4294FF9F0}"/>
               </a:ext>
             </a:extLst>
           </p:cNvPr>
@@ -1145,11 +1136,11 @@
           <a:bodyPr/>
           <a:lstStyle/>
           <a:p>
-            <a:fld id="{B81DB0FC-38F9-4B57-800B-F8279C774594}" type="datetimeFigureOut">
-              <a:rPr lang="en-US" smtClean="0"/>
-              <a:t>6/2/2021</a:t>
+            <a:fld id="{A0C1EF5A-6466-4AAF-9EAB-79C396D6076C}" type="datetimeFigureOut">
+              <a:rPr lang="de-DE" smtClean="0"/>
+              <a:t>20.04.2022</a:t>
             </a:fld>
-            <a:endParaRPr lang="en-US"/>
+            <a:endParaRPr lang="de-DE"/>
           </a:p>
         </p:txBody>
       </p:sp>
@@ -1158,7 +1149,7 @@
           <p:cNvPr id="5" name="Fußzeilenplatzhalter 4">
             <a:extLst>
               <a:ext uri="{FF2B5EF4-FFF2-40B4-BE49-F238E27FC236}">
-                <a16:creationId xmlns:a16="http://schemas.microsoft.com/office/drawing/2014/main" id="{EE587362-4BA0-4710-BA75-868D32926F5B}"/>
+                <a16:creationId xmlns:a16="http://schemas.microsoft.com/office/drawing/2014/main" id="{A76C3056-8CC8-4B66-A877-DA2B320E9856}"/>
               </a:ext>
             </a:extLst>
           </p:cNvPr>
@@ -1174,7 +1165,7 @@
           <a:bodyPr/>
           <a:lstStyle/>
           <a:p>
-            <a:endParaRPr lang="en-US"/>
+            <a:endParaRPr lang="de-DE"/>
           </a:p>
         </p:txBody>
       </p:sp>
@@ -1183,7 +1174,7 @@
           <p:cNvPr id="6" name="Foliennummernplatzhalter 5">
             <a:extLst>
               <a:ext uri="{FF2B5EF4-FFF2-40B4-BE49-F238E27FC236}">
-                <a16:creationId xmlns:a16="http://schemas.microsoft.com/office/drawing/2014/main" id="{6F73479C-7E1B-4F09-91DE-5A1497F74754}"/>
+                <a16:creationId xmlns:a16="http://schemas.microsoft.com/office/drawing/2014/main" id="{6C1B733F-CE69-46B4-8566-6067E941B2C7}"/>
               </a:ext>
             </a:extLst>
           </p:cNvPr>
@@ -1199,18 +1190,18 @@
           <a:bodyPr/>
           <a:lstStyle/>
           <a:p>
-            <a:fld id="{7C276BE0-062B-4BA0-AAE5-1A8DABE9CE8D}" type="slidenum">
-              <a:rPr lang="en-US" smtClean="0"/>
+            <a:fld id="{F1B9DB0B-2465-48F5-8C3B-03E86B7C345B}" type="slidenum">
+              <a:rPr lang="de-DE" smtClean="0"/>
               <a:t>‹Nr.›</a:t>
             </a:fld>
-            <a:endParaRPr lang="en-US"/>
+            <a:endParaRPr lang="de-DE"/>
           </a:p>
         </p:txBody>
       </p:sp>
     </p:spTree>
     <p:extLst>
       <p:ext uri="{BB962C8B-B14F-4D97-AF65-F5344CB8AC3E}">
-        <p14:creationId xmlns:p14="http://schemas.microsoft.com/office/powerpoint/2010/main" val="3797996068"/>
+        <p14:creationId xmlns:p14="http://schemas.microsoft.com/office/powerpoint/2010/main" val="3240947774"/>
       </p:ext>
     </p:extLst>
   </p:cSld>
@@ -1242,7 +1233,7 @@
           <p:cNvPr id="2" name="Titel 1">
             <a:extLst>
               <a:ext uri="{FF2B5EF4-FFF2-40B4-BE49-F238E27FC236}">
-                <a16:creationId xmlns:a16="http://schemas.microsoft.com/office/drawing/2014/main" id="{1B1A6469-DFD9-4296-9202-98E3C6CFC483}"/>
+                <a16:creationId xmlns:a16="http://schemas.microsoft.com/office/drawing/2014/main" id="{BD72B1C8-D84F-4513-B492-FB25029177F8}"/>
               </a:ext>
             </a:extLst>
           </p:cNvPr>
@@ -1262,7 +1253,6 @@
               <a:rPr lang="de-DE"/>
               <a:t>Mastertitelformat bearbeiten</a:t>
             </a:r>
-            <a:endParaRPr lang="en-US"/>
           </a:p>
         </p:txBody>
       </p:sp>
@@ -1271,7 +1261,7 @@
           <p:cNvPr id="3" name="Inhaltsplatzhalter 2">
             <a:extLst>
               <a:ext uri="{FF2B5EF4-FFF2-40B4-BE49-F238E27FC236}">
-                <a16:creationId xmlns:a16="http://schemas.microsoft.com/office/drawing/2014/main" id="{29C6EFD3-5DFC-4D16-A1DE-291D8583072E}"/>
+                <a16:creationId xmlns:a16="http://schemas.microsoft.com/office/drawing/2014/main" id="{E2FC6F0A-B818-45E2-B732-55389055E7D9}"/>
               </a:ext>
             </a:extLst>
           </p:cNvPr>
@@ -1325,7 +1315,6 @@
               <a:rPr lang="de-DE"/>
               <a:t>Fünfte Ebene</a:t>
             </a:r>
-            <a:endParaRPr lang="en-US"/>
           </a:p>
         </p:txBody>
       </p:sp>
@@ -1334,7 +1323,7 @@
           <p:cNvPr id="4" name="Inhaltsplatzhalter 3">
             <a:extLst>
               <a:ext uri="{FF2B5EF4-FFF2-40B4-BE49-F238E27FC236}">
-                <a16:creationId xmlns:a16="http://schemas.microsoft.com/office/drawing/2014/main" id="{840E519C-2F22-429C-B901-D77D7C328280}"/>
+                <a16:creationId xmlns:a16="http://schemas.microsoft.com/office/drawing/2014/main" id="{DAD30B45-DA93-466D-9A44-24A1306FEB09}"/>
               </a:ext>
             </a:extLst>
           </p:cNvPr>
@@ -1388,7 +1377,6 @@
               <a:rPr lang="de-DE"/>
               <a:t>Fünfte Ebene</a:t>
             </a:r>
-            <a:endParaRPr lang="en-US"/>
           </a:p>
         </p:txBody>
       </p:sp>
@@ -1397,7 +1385,7 @@
           <p:cNvPr id="5" name="Datumsplatzhalter 4">
             <a:extLst>
               <a:ext uri="{FF2B5EF4-FFF2-40B4-BE49-F238E27FC236}">
-                <a16:creationId xmlns:a16="http://schemas.microsoft.com/office/drawing/2014/main" id="{8938E996-8CF6-4FE3-8279-6133D5DFC76E}"/>
+                <a16:creationId xmlns:a16="http://schemas.microsoft.com/office/drawing/2014/main" id="{346E9A01-FF3C-4DF0-88AD-40014CF691AD}"/>
               </a:ext>
             </a:extLst>
           </p:cNvPr>
@@ -1413,11 +1401,11 @@
           <a:bodyPr/>
           <a:lstStyle/>
           <a:p>
-            <a:fld id="{B81DB0FC-38F9-4B57-800B-F8279C774594}" type="datetimeFigureOut">
-              <a:rPr lang="en-US" smtClean="0"/>
-              <a:t>6/2/2021</a:t>
+            <a:fld id="{A0C1EF5A-6466-4AAF-9EAB-79C396D6076C}" type="datetimeFigureOut">
+              <a:rPr lang="de-DE" smtClean="0"/>
+              <a:t>20.04.2022</a:t>
             </a:fld>
-            <a:endParaRPr lang="en-US"/>
+            <a:endParaRPr lang="de-DE"/>
           </a:p>
         </p:txBody>
       </p:sp>
@@ -1426,7 +1414,7 @@
           <p:cNvPr id="6" name="Fußzeilenplatzhalter 5">
             <a:extLst>
               <a:ext uri="{FF2B5EF4-FFF2-40B4-BE49-F238E27FC236}">
-                <a16:creationId xmlns:a16="http://schemas.microsoft.com/office/drawing/2014/main" id="{9332FE66-ED59-4B4D-9302-4810A1CE2232}"/>
+                <a16:creationId xmlns:a16="http://schemas.microsoft.com/office/drawing/2014/main" id="{E183246B-9AE3-4A56-8CC1-A19AC709F851}"/>
               </a:ext>
             </a:extLst>
           </p:cNvPr>
@@ -1442,7 +1430,7 @@
           <a:bodyPr/>
           <a:lstStyle/>
           <a:p>
-            <a:endParaRPr lang="en-US"/>
+            <a:endParaRPr lang="de-DE"/>
           </a:p>
         </p:txBody>
       </p:sp>
@@ -1451,7 +1439,7 @@
           <p:cNvPr id="7" name="Foliennummernplatzhalter 6">
             <a:extLst>
               <a:ext uri="{FF2B5EF4-FFF2-40B4-BE49-F238E27FC236}">
-                <a16:creationId xmlns:a16="http://schemas.microsoft.com/office/drawing/2014/main" id="{897B8DD6-F706-413A-8A09-A11627A05E5D}"/>
+                <a16:creationId xmlns:a16="http://schemas.microsoft.com/office/drawing/2014/main" id="{C21F208F-17EA-4C10-A16A-76F50586978C}"/>
               </a:ext>
             </a:extLst>
           </p:cNvPr>
@@ -1467,18 +1455,18 @@
           <a:bodyPr/>
           <a:lstStyle/>
           <a:p>
-            <a:fld id="{7C276BE0-062B-4BA0-AAE5-1A8DABE9CE8D}" type="slidenum">
-              <a:rPr lang="en-US" smtClean="0"/>
+            <a:fld id="{F1B9DB0B-2465-48F5-8C3B-03E86B7C345B}" type="slidenum">
+              <a:rPr lang="de-DE" smtClean="0"/>
               <a:t>‹Nr.›</a:t>
             </a:fld>
-            <a:endParaRPr lang="en-US"/>
+            <a:endParaRPr lang="de-DE"/>
           </a:p>
         </p:txBody>
       </p:sp>
     </p:spTree>
     <p:extLst>
       <p:ext uri="{BB962C8B-B14F-4D97-AF65-F5344CB8AC3E}">
-        <p14:creationId xmlns:p14="http://schemas.microsoft.com/office/powerpoint/2010/main" val="413795315"/>
+        <p14:creationId xmlns:p14="http://schemas.microsoft.com/office/powerpoint/2010/main" val="3743038553"/>
       </p:ext>
     </p:extLst>
   </p:cSld>
@@ -1510,7 +1498,7 @@
           <p:cNvPr id="2" name="Titel 1">
             <a:extLst>
               <a:ext uri="{FF2B5EF4-FFF2-40B4-BE49-F238E27FC236}">
-                <a16:creationId xmlns:a16="http://schemas.microsoft.com/office/drawing/2014/main" id="{DE64E049-F7D7-4138-A90A-E702E5F75D55}"/>
+                <a16:creationId xmlns:a16="http://schemas.microsoft.com/office/drawing/2014/main" id="{CC500939-1570-4BC0-AEA4-1B10CC2D3E01}"/>
               </a:ext>
             </a:extLst>
           </p:cNvPr>
@@ -1535,7 +1523,6 @@
               <a:rPr lang="de-DE"/>
               <a:t>Mastertitelformat bearbeiten</a:t>
             </a:r>
-            <a:endParaRPr lang="en-US"/>
           </a:p>
         </p:txBody>
       </p:sp>
@@ -1544,7 +1531,7 @@
           <p:cNvPr id="3" name="Textplatzhalter 2">
             <a:extLst>
               <a:ext uri="{FF2B5EF4-FFF2-40B4-BE49-F238E27FC236}">
-                <a16:creationId xmlns:a16="http://schemas.microsoft.com/office/drawing/2014/main" id="{7FBE43D1-F6D3-4211-B3E2-175A5F5C8790}"/>
+                <a16:creationId xmlns:a16="http://schemas.microsoft.com/office/drawing/2014/main" id="{8A808E60-4F27-4BE6-BCE8-4AD1716DE5B7}"/>
               </a:ext>
             </a:extLst>
           </p:cNvPr>
@@ -1615,7 +1602,7 @@
           <p:cNvPr id="4" name="Inhaltsplatzhalter 3">
             <a:extLst>
               <a:ext uri="{FF2B5EF4-FFF2-40B4-BE49-F238E27FC236}">
-                <a16:creationId xmlns:a16="http://schemas.microsoft.com/office/drawing/2014/main" id="{DBFF80BE-9016-4C2B-98B3-DB8ED3F99575}"/>
+                <a16:creationId xmlns:a16="http://schemas.microsoft.com/office/drawing/2014/main" id="{F7DCB1D2-C9F6-4A4B-9F6B-87A83FA67346}"/>
               </a:ext>
             </a:extLst>
           </p:cNvPr>
@@ -1669,7 +1656,6 @@
               <a:rPr lang="de-DE"/>
               <a:t>Fünfte Ebene</a:t>
             </a:r>
-            <a:endParaRPr lang="en-US"/>
           </a:p>
         </p:txBody>
       </p:sp>
@@ -1678,7 +1664,7 @@
           <p:cNvPr id="5" name="Textplatzhalter 4">
             <a:extLst>
               <a:ext uri="{FF2B5EF4-FFF2-40B4-BE49-F238E27FC236}">
-                <a16:creationId xmlns:a16="http://schemas.microsoft.com/office/drawing/2014/main" id="{5A8EEB34-55EF-429F-9908-E1FB04001A46}"/>
+                <a16:creationId xmlns:a16="http://schemas.microsoft.com/office/drawing/2014/main" id="{E8DA647C-8D83-4236-91B0-55B04A6655E0}"/>
               </a:ext>
             </a:extLst>
           </p:cNvPr>
@@ -1749,7 +1735,7 @@
           <p:cNvPr id="6" name="Inhaltsplatzhalter 5">
             <a:extLst>
               <a:ext uri="{FF2B5EF4-FFF2-40B4-BE49-F238E27FC236}">
-                <a16:creationId xmlns:a16="http://schemas.microsoft.com/office/drawing/2014/main" id="{ABCE98B8-3F7D-4AF6-B939-14808E71B243}"/>
+                <a16:creationId xmlns:a16="http://schemas.microsoft.com/office/drawing/2014/main" id="{C5EE8AC0-98C9-4128-97F9-2CFC9569E5CD}"/>
               </a:ext>
             </a:extLst>
           </p:cNvPr>
@@ -1803,7 +1789,6 @@
               <a:rPr lang="de-DE"/>
               <a:t>Fünfte Ebene</a:t>
             </a:r>
-            <a:endParaRPr lang="en-US"/>
           </a:p>
         </p:txBody>
       </p:sp>
@@ -1812,7 +1797,7 @@
           <p:cNvPr id="7" name="Datumsplatzhalter 6">
             <a:extLst>
               <a:ext uri="{FF2B5EF4-FFF2-40B4-BE49-F238E27FC236}">
-                <a16:creationId xmlns:a16="http://schemas.microsoft.com/office/drawing/2014/main" id="{2D472B1C-14AB-45D6-920E-7678267A6020}"/>
+                <a16:creationId xmlns:a16="http://schemas.microsoft.com/office/drawing/2014/main" id="{1EFC616F-4C67-4D0A-B70B-DACA52010C14}"/>
               </a:ext>
             </a:extLst>
           </p:cNvPr>
@@ -1828,11 +1813,11 @@
           <a:bodyPr/>
           <a:lstStyle/>
           <a:p>
-            <a:fld id="{B81DB0FC-38F9-4B57-800B-F8279C774594}" type="datetimeFigureOut">
-              <a:rPr lang="en-US" smtClean="0"/>
-              <a:t>6/2/2021</a:t>
+            <a:fld id="{A0C1EF5A-6466-4AAF-9EAB-79C396D6076C}" type="datetimeFigureOut">
+              <a:rPr lang="de-DE" smtClean="0"/>
+              <a:t>20.04.2022</a:t>
             </a:fld>
-            <a:endParaRPr lang="en-US"/>
+            <a:endParaRPr lang="de-DE"/>
           </a:p>
         </p:txBody>
       </p:sp>
@@ -1841,7 +1826,7 @@
           <p:cNvPr id="8" name="Fußzeilenplatzhalter 7">
             <a:extLst>
               <a:ext uri="{FF2B5EF4-FFF2-40B4-BE49-F238E27FC236}">
-                <a16:creationId xmlns:a16="http://schemas.microsoft.com/office/drawing/2014/main" id="{CB9CE951-86BA-4CF4-8683-3F9BCACD38F6}"/>
+                <a16:creationId xmlns:a16="http://schemas.microsoft.com/office/drawing/2014/main" id="{5E51FF0B-24D1-441B-BCD4-B9653FFA3524}"/>
               </a:ext>
             </a:extLst>
           </p:cNvPr>
@@ -1857,7 +1842,7 @@
           <a:bodyPr/>
           <a:lstStyle/>
           <a:p>
-            <a:endParaRPr lang="en-US"/>
+            <a:endParaRPr lang="de-DE"/>
           </a:p>
         </p:txBody>
       </p:sp>
@@ -1866,7 +1851,7 @@
           <p:cNvPr id="9" name="Foliennummernplatzhalter 8">
             <a:extLst>
               <a:ext uri="{FF2B5EF4-FFF2-40B4-BE49-F238E27FC236}">
-                <a16:creationId xmlns:a16="http://schemas.microsoft.com/office/drawing/2014/main" id="{D7A9364F-1779-4647-9471-9FF24D58CA0B}"/>
+                <a16:creationId xmlns:a16="http://schemas.microsoft.com/office/drawing/2014/main" id="{F9861A67-EBA6-4DDF-BF7F-36307D2D2B5D}"/>
               </a:ext>
             </a:extLst>
           </p:cNvPr>
@@ -1882,18 +1867,18 @@
           <a:bodyPr/>
           <a:lstStyle/>
           <a:p>
-            <a:fld id="{7C276BE0-062B-4BA0-AAE5-1A8DABE9CE8D}" type="slidenum">
-              <a:rPr lang="en-US" smtClean="0"/>
+            <a:fld id="{F1B9DB0B-2465-48F5-8C3B-03E86B7C345B}" type="slidenum">
+              <a:rPr lang="de-DE" smtClean="0"/>
               <a:t>‹Nr.›</a:t>
             </a:fld>
-            <a:endParaRPr lang="en-US"/>
+            <a:endParaRPr lang="de-DE"/>
           </a:p>
         </p:txBody>
       </p:sp>
     </p:spTree>
     <p:extLst>
       <p:ext uri="{BB962C8B-B14F-4D97-AF65-F5344CB8AC3E}">
-        <p14:creationId xmlns:p14="http://schemas.microsoft.com/office/powerpoint/2010/main" val="2230632511"/>
+        <p14:creationId xmlns:p14="http://schemas.microsoft.com/office/powerpoint/2010/main" val="37035907"/>
       </p:ext>
     </p:extLst>
   </p:cSld>
@@ -1925,7 +1910,7 @@
           <p:cNvPr id="2" name="Titel 1">
             <a:extLst>
               <a:ext uri="{FF2B5EF4-FFF2-40B4-BE49-F238E27FC236}">
-                <a16:creationId xmlns:a16="http://schemas.microsoft.com/office/drawing/2014/main" id="{EE020957-8D6A-4325-AF66-F76EB56B734D}"/>
+                <a16:creationId xmlns:a16="http://schemas.microsoft.com/office/drawing/2014/main" id="{F9130A71-579E-44FB-8418-F3ECD9810D99}"/>
               </a:ext>
             </a:extLst>
           </p:cNvPr>
@@ -1945,7 +1930,6 @@
               <a:rPr lang="de-DE"/>
               <a:t>Mastertitelformat bearbeiten</a:t>
             </a:r>
-            <a:endParaRPr lang="en-US"/>
           </a:p>
         </p:txBody>
       </p:sp>
@@ -1954,7 +1938,7 @@
           <p:cNvPr id="3" name="Datumsplatzhalter 2">
             <a:extLst>
               <a:ext uri="{FF2B5EF4-FFF2-40B4-BE49-F238E27FC236}">
-                <a16:creationId xmlns:a16="http://schemas.microsoft.com/office/drawing/2014/main" id="{47C3CBE8-E49E-41F7-A89E-4B26308A3415}"/>
+                <a16:creationId xmlns:a16="http://schemas.microsoft.com/office/drawing/2014/main" id="{A4BBA475-DF43-492B-90B5-E5B0AFB61D2C}"/>
               </a:ext>
             </a:extLst>
           </p:cNvPr>
@@ -1970,11 +1954,11 @@
           <a:bodyPr/>
           <a:lstStyle/>
           <a:p>
-            <a:fld id="{B81DB0FC-38F9-4B57-800B-F8279C774594}" type="datetimeFigureOut">
-              <a:rPr lang="en-US" smtClean="0"/>
-              <a:t>6/2/2021</a:t>
+            <a:fld id="{A0C1EF5A-6466-4AAF-9EAB-79C396D6076C}" type="datetimeFigureOut">
+              <a:rPr lang="de-DE" smtClean="0"/>
+              <a:t>20.04.2022</a:t>
             </a:fld>
-            <a:endParaRPr lang="en-US"/>
+            <a:endParaRPr lang="de-DE"/>
           </a:p>
         </p:txBody>
       </p:sp>
@@ -1983,7 +1967,7 @@
           <p:cNvPr id="4" name="Fußzeilenplatzhalter 3">
             <a:extLst>
               <a:ext uri="{FF2B5EF4-FFF2-40B4-BE49-F238E27FC236}">
-                <a16:creationId xmlns:a16="http://schemas.microsoft.com/office/drawing/2014/main" id="{A44096B0-ED34-4BDE-B4A3-BB8479E3353E}"/>
+                <a16:creationId xmlns:a16="http://schemas.microsoft.com/office/drawing/2014/main" id="{E1165776-E2D2-44F2-9A8D-7AEFA97D0BF9}"/>
               </a:ext>
             </a:extLst>
           </p:cNvPr>
@@ -1999,7 +1983,7 @@
           <a:bodyPr/>
           <a:lstStyle/>
           <a:p>
-            <a:endParaRPr lang="en-US"/>
+            <a:endParaRPr lang="de-DE"/>
           </a:p>
         </p:txBody>
       </p:sp>
@@ -2008,7 +1992,7 @@
           <p:cNvPr id="5" name="Foliennummernplatzhalter 4">
             <a:extLst>
               <a:ext uri="{FF2B5EF4-FFF2-40B4-BE49-F238E27FC236}">
-                <a16:creationId xmlns:a16="http://schemas.microsoft.com/office/drawing/2014/main" id="{26819A2A-EB12-4EB1-95F6-CD16C4182B51}"/>
+                <a16:creationId xmlns:a16="http://schemas.microsoft.com/office/drawing/2014/main" id="{F5430664-ECAE-495A-B6CF-A9836273D087}"/>
               </a:ext>
             </a:extLst>
           </p:cNvPr>
@@ -2024,18 +2008,18 @@
           <a:bodyPr/>
           <a:lstStyle/>
           <a:p>
-            <a:fld id="{7C276BE0-062B-4BA0-AAE5-1A8DABE9CE8D}" type="slidenum">
-              <a:rPr lang="en-US" smtClean="0"/>
+            <a:fld id="{F1B9DB0B-2465-48F5-8C3B-03E86B7C345B}" type="slidenum">
+              <a:rPr lang="de-DE" smtClean="0"/>
               <a:t>‹Nr.›</a:t>
             </a:fld>
-            <a:endParaRPr lang="en-US"/>
+            <a:endParaRPr lang="de-DE"/>
           </a:p>
         </p:txBody>
       </p:sp>
     </p:spTree>
     <p:extLst>
       <p:ext uri="{BB962C8B-B14F-4D97-AF65-F5344CB8AC3E}">
-        <p14:creationId xmlns:p14="http://schemas.microsoft.com/office/powerpoint/2010/main" val="1599436600"/>
+        <p14:creationId xmlns:p14="http://schemas.microsoft.com/office/powerpoint/2010/main" val="3637730071"/>
       </p:ext>
     </p:extLst>
   </p:cSld>
@@ -2067,7 +2051,7 @@
           <p:cNvPr id="2" name="Datumsplatzhalter 1">
             <a:extLst>
               <a:ext uri="{FF2B5EF4-FFF2-40B4-BE49-F238E27FC236}">
-                <a16:creationId xmlns:a16="http://schemas.microsoft.com/office/drawing/2014/main" id="{47EB92AC-2E30-4BE0-8ADC-BAC51A19A32A}"/>
+                <a16:creationId xmlns:a16="http://schemas.microsoft.com/office/drawing/2014/main" id="{538E703B-D078-47C2-B422-C4A7BE533F3E}"/>
               </a:ext>
             </a:extLst>
           </p:cNvPr>
@@ -2083,11 +2067,11 @@
           <a:bodyPr/>
           <a:lstStyle/>
           <a:p>
-            <a:fld id="{B81DB0FC-38F9-4B57-800B-F8279C774594}" type="datetimeFigureOut">
-              <a:rPr lang="en-US" smtClean="0"/>
-              <a:t>6/2/2021</a:t>
+            <a:fld id="{A0C1EF5A-6466-4AAF-9EAB-79C396D6076C}" type="datetimeFigureOut">
+              <a:rPr lang="de-DE" smtClean="0"/>
+              <a:t>20.04.2022</a:t>
             </a:fld>
-            <a:endParaRPr lang="en-US"/>
+            <a:endParaRPr lang="de-DE"/>
           </a:p>
         </p:txBody>
       </p:sp>
@@ -2096,7 +2080,7 @@
           <p:cNvPr id="3" name="Fußzeilenplatzhalter 2">
             <a:extLst>
               <a:ext uri="{FF2B5EF4-FFF2-40B4-BE49-F238E27FC236}">
-                <a16:creationId xmlns:a16="http://schemas.microsoft.com/office/drawing/2014/main" id="{72455626-C614-4267-9988-13D111541E7C}"/>
+                <a16:creationId xmlns:a16="http://schemas.microsoft.com/office/drawing/2014/main" id="{3D5ADF6A-9EAD-4C93-9739-F39F3A8D9C2F}"/>
               </a:ext>
             </a:extLst>
           </p:cNvPr>
@@ -2112,7 +2096,7 @@
           <a:bodyPr/>
           <a:lstStyle/>
           <a:p>
-            <a:endParaRPr lang="en-US"/>
+            <a:endParaRPr lang="de-DE"/>
           </a:p>
         </p:txBody>
       </p:sp>
@@ -2121,7 +2105,7 @@
           <p:cNvPr id="4" name="Foliennummernplatzhalter 3">
             <a:extLst>
               <a:ext uri="{FF2B5EF4-FFF2-40B4-BE49-F238E27FC236}">
-                <a16:creationId xmlns:a16="http://schemas.microsoft.com/office/drawing/2014/main" id="{021F4969-78A0-4A6F-A63E-7DC80AB69603}"/>
+                <a16:creationId xmlns:a16="http://schemas.microsoft.com/office/drawing/2014/main" id="{0DC0EEDE-B5C4-4ACE-B6CC-191455BE9005}"/>
               </a:ext>
             </a:extLst>
           </p:cNvPr>
@@ -2137,18 +2121,18 @@
           <a:bodyPr/>
           <a:lstStyle/>
           <a:p>
-            <a:fld id="{7C276BE0-062B-4BA0-AAE5-1A8DABE9CE8D}" type="slidenum">
-              <a:rPr lang="en-US" smtClean="0"/>
+            <a:fld id="{F1B9DB0B-2465-48F5-8C3B-03E86B7C345B}" type="slidenum">
+              <a:rPr lang="de-DE" smtClean="0"/>
               <a:t>‹Nr.›</a:t>
             </a:fld>
-            <a:endParaRPr lang="en-US"/>
+            <a:endParaRPr lang="de-DE"/>
           </a:p>
         </p:txBody>
       </p:sp>
     </p:spTree>
     <p:extLst>
       <p:ext uri="{BB962C8B-B14F-4D97-AF65-F5344CB8AC3E}">
-        <p14:creationId xmlns:p14="http://schemas.microsoft.com/office/powerpoint/2010/main" val="3656579478"/>
+        <p14:creationId xmlns:p14="http://schemas.microsoft.com/office/powerpoint/2010/main" val="522307688"/>
       </p:ext>
     </p:extLst>
   </p:cSld>
@@ -2180,7 +2164,7 @@
           <p:cNvPr id="2" name="Titel 1">
             <a:extLst>
               <a:ext uri="{FF2B5EF4-FFF2-40B4-BE49-F238E27FC236}">
-                <a16:creationId xmlns:a16="http://schemas.microsoft.com/office/drawing/2014/main" id="{10903F31-E3EC-4A12-90D0-D32B49E4E4ED}"/>
+                <a16:creationId xmlns:a16="http://schemas.microsoft.com/office/drawing/2014/main" id="{3B5116E9-2425-468C-A138-C6B6027106F3}"/>
               </a:ext>
             </a:extLst>
           </p:cNvPr>
@@ -2209,7 +2193,6 @@
               <a:rPr lang="de-DE"/>
               <a:t>Mastertitelformat bearbeiten</a:t>
             </a:r>
-            <a:endParaRPr lang="en-US"/>
           </a:p>
         </p:txBody>
       </p:sp>
@@ -2218,7 +2201,7 @@
           <p:cNvPr id="3" name="Inhaltsplatzhalter 2">
             <a:extLst>
               <a:ext uri="{FF2B5EF4-FFF2-40B4-BE49-F238E27FC236}">
-                <a16:creationId xmlns:a16="http://schemas.microsoft.com/office/drawing/2014/main" id="{D14F533A-ADDC-4BF8-BE27-1AC172606E3C}"/>
+                <a16:creationId xmlns:a16="http://schemas.microsoft.com/office/drawing/2014/main" id="{AF9BB383-E0E2-48C2-9985-F850C594A0E5}"/>
               </a:ext>
             </a:extLst>
           </p:cNvPr>
@@ -2300,7 +2283,6 @@
               <a:rPr lang="de-DE"/>
               <a:t>Fünfte Ebene</a:t>
             </a:r>
-            <a:endParaRPr lang="en-US"/>
           </a:p>
         </p:txBody>
       </p:sp>
@@ -2309,7 +2291,7 @@
           <p:cNvPr id="4" name="Textplatzhalter 3">
             <a:extLst>
               <a:ext uri="{FF2B5EF4-FFF2-40B4-BE49-F238E27FC236}">
-                <a16:creationId xmlns:a16="http://schemas.microsoft.com/office/drawing/2014/main" id="{09AF0A0D-200A-492E-BE78-C00A344A9D6A}"/>
+                <a16:creationId xmlns:a16="http://schemas.microsoft.com/office/drawing/2014/main" id="{64A1D0BB-85D1-441C-B372-A68398EC3B25}"/>
               </a:ext>
             </a:extLst>
           </p:cNvPr>
@@ -2380,7 +2362,7 @@
           <p:cNvPr id="5" name="Datumsplatzhalter 4">
             <a:extLst>
               <a:ext uri="{FF2B5EF4-FFF2-40B4-BE49-F238E27FC236}">
-                <a16:creationId xmlns:a16="http://schemas.microsoft.com/office/drawing/2014/main" id="{3A51B5EA-FFF9-4A0A-97E4-D000BA8D4665}"/>
+                <a16:creationId xmlns:a16="http://schemas.microsoft.com/office/drawing/2014/main" id="{0864F32C-F157-4B90-ACE8-471B0B22D465}"/>
               </a:ext>
             </a:extLst>
           </p:cNvPr>
@@ -2396,11 +2378,11 @@
           <a:bodyPr/>
           <a:lstStyle/>
           <a:p>
-            <a:fld id="{B81DB0FC-38F9-4B57-800B-F8279C774594}" type="datetimeFigureOut">
-              <a:rPr lang="en-US" smtClean="0"/>
-              <a:t>6/2/2021</a:t>
+            <a:fld id="{A0C1EF5A-6466-4AAF-9EAB-79C396D6076C}" type="datetimeFigureOut">
+              <a:rPr lang="de-DE" smtClean="0"/>
+              <a:t>20.04.2022</a:t>
             </a:fld>
-            <a:endParaRPr lang="en-US"/>
+            <a:endParaRPr lang="de-DE"/>
           </a:p>
         </p:txBody>
       </p:sp>
@@ -2409,7 +2391,7 @@
           <p:cNvPr id="6" name="Fußzeilenplatzhalter 5">
             <a:extLst>
               <a:ext uri="{FF2B5EF4-FFF2-40B4-BE49-F238E27FC236}">
-                <a16:creationId xmlns:a16="http://schemas.microsoft.com/office/drawing/2014/main" id="{24D77421-2920-47EE-9E1B-B9BE0FD02794}"/>
+                <a16:creationId xmlns:a16="http://schemas.microsoft.com/office/drawing/2014/main" id="{0D16678D-5933-4816-8696-E341173450A9}"/>
               </a:ext>
             </a:extLst>
           </p:cNvPr>
@@ -2425,7 +2407,7 @@
           <a:bodyPr/>
           <a:lstStyle/>
           <a:p>
-            <a:endParaRPr lang="en-US"/>
+            <a:endParaRPr lang="de-DE"/>
           </a:p>
         </p:txBody>
       </p:sp>
@@ -2434,7 +2416,7 @@
           <p:cNvPr id="7" name="Foliennummernplatzhalter 6">
             <a:extLst>
               <a:ext uri="{FF2B5EF4-FFF2-40B4-BE49-F238E27FC236}">
-                <a16:creationId xmlns:a16="http://schemas.microsoft.com/office/drawing/2014/main" id="{008F70FC-90C0-4D09-9F21-F259D07508BE}"/>
+                <a16:creationId xmlns:a16="http://schemas.microsoft.com/office/drawing/2014/main" id="{43811190-C8C5-4FC8-82F5-5BA10F529F8B}"/>
               </a:ext>
             </a:extLst>
           </p:cNvPr>
@@ -2450,18 +2432,18 @@
           <a:bodyPr/>
           <a:lstStyle/>
           <a:p>
-            <a:fld id="{7C276BE0-062B-4BA0-AAE5-1A8DABE9CE8D}" type="slidenum">
-              <a:rPr lang="en-US" smtClean="0"/>
+            <a:fld id="{F1B9DB0B-2465-48F5-8C3B-03E86B7C345B}" type="slidenum">
+              <a:rPr lang="de-DE" smtClean="0"/>
               <a:t>‹Nr.›</a:t>
             </a:fld>
-            <a:endParaRPr lang="en-US"/>
+            <a:endParaRPr lang="de-DE"/>
           </a:p>
         </p:txBody>
       </p:sp>
     </p:spTree>
     <p:extLst>
       <p:ext uri="{BB962C8B-B14F-4D97-AF65-F5344CB8AC3E}">
-        <p14:creationId xmlns:p14="http://schemas.microsoft.com/office/powerpoint/2010/main" val="124851940"/>
+        <p14:creationId xmlns:p14="http://schemas.microsoft.com/office/powerpoint/2010/main" val="1728806414"/>
       </p:ext>
     </p:extLst>
   </p:cSld>
@@ -2493,7 +2475,7 @@
           <p:cNvPr id="2" name="Titel 1">
             <a:extLst>
               <a:ext uri="{FF2B5EF4-FFF2-40B4-BE49-F238E27FC236}">
-                <a16:creationId xmlns:a16="http://schemas.microsoft.com/office/drawing/2014/main" id="{550E417E-3658-4E37-ABE0-F82A8E67290E}"/>
+                <a16:creationId xmlns:a16="http://schemas.microsoft.com/office/drawing/2014/main" id="{A8481C4E-0D36-4A5D-9DB2-869E5B5C9FFF}"/>
               </a:ext>
             </a:extLst>
           </p:cNvPr>
@@ -2522,7 +2504,6 @@
               <a:rPr lang="de-DE"/>
               <a:t>Mastertitelformat bearbeiten</a:t>
             </a:r>
-            <a:endParaRPr lang="en-US"/>
           </a:p>
         </p:txBody>
       </p:sp>
@@ -2531,7 +2512,7 @@
           <p:cNvPr id="3" name="Bildplatzhalter 2">
             <a:extLst>
               <a:ext uri="{FF2B5EF4-FFF2-40B4-BE49-F238E27FC236}">
-                <a16:creationId xmlns:a16="http://schemas.microsoft.com/office/drawing/2014/main" id="{E0849FB3-890C-4258-B3B5-9A5CFE4C7394}"/>
+                <a16:creationId xmlns:a16="http://schemas.microsoft.com/office/drawing/2014/main" id="{B0F389AE-CE3B-4139-8166-8B6BEC3A5148}"/>
               </a:ext>
             </a:extLst>
           </p:cNvPr>
@@ -2589,7 +2570,7 @@
             </a:lvl9pPr>
           </a:lstStyle>
           <a:p>
-            <a:endParaRPr lang="en-US"/>
+            <a:endParaRPr lang="de-DE"/>
           </a:p>
         </p:txBody>
       </p:sp>
@@ -2598,7 +2579,7 @@
           <p:cNvPr id="4" name="Textplatzhalter 3">
             <a:extLst>
               <a:ext uri="{FF2B5EF4-FFF2-40B4-BE49-F238E27FC236}">
-                <a16:creationId xmlns:a16="http://schemas.microsoft.com/office/drawing/2014/main" id="{36CB23F5-5F4D-4EFF-B134-C088853F40DA}"/>
+                <a16:creationId xmlns:a16="http://schemas.microsoft.com/office/drawing/2014/main" id="{408496E6-E932-403B-B20B-CC12D9F74205}"/>
               </a:ext>
             </a:extLst>
           </p:cNvPr>
@@ -2669,7 +2650,7 @@
           <p:cNvPr id="5" name="Datumsplatzhalter 4">
             <a:extLst>
               <a:ext uri="{FF2B5EF4-FFF2-40B4-BE49-F238E27FC236}">
-                <a16:creationId xmlns:a16="http://schemas.microsoft.com/office/drawing/2014/main" id="{46BC2737-9346-4529-85F0-3D5BEBE5A2F0}"/>
+                <a16:creationId xmlns:a16="http://schemas.microsoft.com/office/drawing/2014/main" id="{2676FB4B-0DE4-4D3B-8D11-CECC0248AC1C}"/>
               </a:ext>
             </a:extLst>
           </p:cNvPr>
@@ -2685,11 +2666,11 @@
           <a:bodyPr/>
           <a:lstStyle/>
           <a:p>
-            <a:fld id="{B81DB0FC-38F9-4B57-800B-F8279C774594}" type="datetimeFigureOut">
-              <a:rPr lang="en-US" smtClean="0"/>
-              <a:t>6/2/2021</a:t>
+            <a:fld id="{A0C1EF5A-6466-4AAF-9EAB-79C396D6076C}" type="datetimeFigureOut">
+              <a:rPr lang="de-DE" smtClean="0"/>
+              <a:t>20.04.2022</a:t>
             </a:fld>
-            <a:endParaRPr lang="en-US"/>
+            <a:endParaRPr lang="de-DE"/>
           </a:p>
         </p:txBody>
       </p:sp>
@@ -2698,7 +2679,7 @@
           <p:cNvPr id="6" name="Fußzeilenplatzhalter 5">
             <a:extLst>
               <a:ext uri="{FF2B5EF4-FFF2-40B4-BE49-F238E27FC236}">
-                <a16:creationId xmlns:a16="http://schemas.microsoft.com/office/drawing/2014/main" id="{14AEA8EA-F45C-43FF-A1A7-06E0FBE4ED89}"/>
+                <a16:creationId xmlns:a16="http://schemas.microsoft.com/office/drawing/2014/main" id="{E7F24040-B893-44F4-B9C2-9088E0DDC435}"/>
               </a:ext>
             </a:extLst>
           </p:cNvPr>
@@ -2714,7 +2695,7 @@
           <a:bodyPr/>
           <a:lstStyle/>
           <a:p>
-            <a:endParaRPr lang="en-US"/>
+            <a:endParaRPr lang="de-DE"/>
           </a:p>
         </p:txBody>
       </p:sp>
@@ -2723,7 +2704,7 @@
           <p:cNvPr id="7" name="Foliennummernplatzhalter 6">
             <a:extLst>
               <a:ext uri="{FF2B5EF4-FFF2-40B4-BE49-F238E27FC236}">
-                <a16:creationId xmlns:a16="http://schemas.microsoft.com/office/drawing/2014/main" id="{434F09DF-F9E9-42DE-A02B-EA7C53F536C2}"/>
+                <a16:creationId xmlns:a16="http://schemas.microsoft.com/office/drawing/2014/main" id="{C8C2B491-97EC-4894-9895-E453B2C3B00E}"/>
               </a:ext>
             </a:extLst>
           </p:cNvPr>
@@ -2739,18 +2720,18 @@
           <a:bodyPr/>
           <a:lstStyle/>
           <a:p>
-            <a:fld id="{7C276BE0-062B-4BA0-AAE5-1A8DABE9CE8D}" type="slidenum">
-              <a:rPr lang="en-US" smtClean="0"/>
+            <a:fld id="{F1B9DB0B-2465-48F5-8C3B-03E86B7C345B}" type="slidenum">
+              <a:rPr lang="de-DE" smtClean="0"/>
               <a:t>‹Nr.›</a:t>
             </a:fld>
-            <a:endParaRPr lang="en-US"/>
+            <a:endParaRPr lang="de-DE"/>
           </a:p>
         </p:txBody>
       </p:sp>
     </p:spTree>
     <p:extLst>
       <p:ext uri="{BB962C8B-B14F-4D97-AF65-F5344CB8AC3E}">
-        <p14:creationId xmlns:p14="http://schemas.microsoft.com/office/powerpoint/2010/main" val="134502557"/>
+        <p14:creationId xmlns:p14="http://schemas.microsoft.com/office/powerpoint/2010/main" val="6282832"/>
       </p:ext>
     </p:extLst>
   </p:cSld>
@@ -2787,7 +2768,7 @@
           <p:cNvPr id="2" name="Titelplatzhalter 1">
             <a:extLst>
               <a:ext uri="{FF2B5EF4-FFF2-40B4-BE49-F238E27FC236}">
-                <a16:creationId xmlns:a16="http://schemas.microsoft.com/office/drawing/2014/main" id="{BF85E5CD-AA3E-4C0F-8A50-9F0EFC4B7CC7}"/>
+                <a16:creationId xmlns:a16="http://schemas.microsoft.com/office/drawing/2014/main" id="{DF9DF9E3-1599-4FC1-B3FF-1DE4AB39CF1F}"/>
               </a:ext>
             </a:extLst>
           </p:cNvPr>
@@ -2817,7 +2798,6 @@
               <a:rPr lang="de-DE"/>
               <a:t>Mastertitelformat bearbeiten</a:t>
             </a:r>
-            <a:endParaRPr lang="en-US"/>
           </a:p>
         </p:txBody>
       </p:sp>
@@ -2826,7 +2806,7 @@
           <p:cNvPr id="3" name="Textplatzhalter 2">
             <a:extLst>
               <a:ext uri="{FF2B5EF4-FFF2-40B4-BE49-F238E27FC236}">
-                <a16:creationId xmlns:a16="http://schemas.microsoft.com/office/drawing/2014/main" id="{4D01E8C0-6495-4E42-85A3-CBC1A79EDCE7}"/>
+                <a16:creationId xmlns:a16="http://schemas.microsoft.com/office/drawing/2014/main" id="{917F95F5-09F3-4E2E-B548-1781899D9C09}"/>
               </a:ext>
             </a:extLst>
           </p:cNvPr>
@@ -2885,7 +2865,6 @@
               <a:rPr lang="de-DE"/>
               <a:t>Fünfte Ebene</a:t>
             </a:r>
-            <a:endParaRPr lang="en-US"/>
           </a:p>
         </p:txBody>
       </p:sp>
@@ -2894,7 +2873,7 @@
           <p:cNvPr id="4" name="Datumsplatzhalter 3">
             <a:extLst>
               <a:ext uri="{FF2B5EF4-FFF2-40B4-BE49-F238E27FC236}">
-                <a16:creationId xmlns:a16="http://schemas.microsoft.com/office/drawing/2014/main" id="{A66F737A-5DC0-4D14-9E4C-23A39B3A7D07}"/>
+                <a16:creationId xmlns:a16="http://schemas.microsoft.com/office/drawing/2014/main" id="{DBE65433-5AD7-409A-B073-9311176AE73B}"/>
               </a:ext>
             </a:extLst>
           </p:cNvPr>
@@ -2928,11 +2907,11 @@
             </a:lvl1pPr>
           </a:lstStyle>
           <a:p>
-            <a:fld id="{B81DB0FC-38F9-4B57-800B-F8279C774594}" type="datetimeFigureOut">
-              <a:rPr lang="en-US" smtClean="0"/>
-              <a:t>6/2/2021</a:t>
+            <a:fld id="{A0C1EF5A-6466-4AAF-9EAB-79C396D6076C}" type="datetimeFigureOut">
+              <a:rPr lang="de-DE" smtClean="0"/>
+              <a:t>20.04.2022</a:t>
             </a:fld>
-            <a:endParaRPr lang="en-US"/>
+            <a:endParaRPr lang="de-DE"/>
           </a:p>
         </p:txBody>
       </p:sp>
@@ -2941,7 +2920,7 @@
           <p:cNvPr id="5" name="Fußzeilenplatzhalter 4">
             <a:extLst>
               <a:ext uri="{FF2B5EF4-FFF2-40B4-BE49-F238E27FC236}">
-                <a16:creationId xmlns:a16="http://schemas.microsoft.com/office/drawing/2014/main" id="{D28252D5-CD70-49D9-820D-82F626348223}"/>
+                <a16:creationId xmlns:a16="http://schemas.microsoft.com/office/drawing/2014/main" id="{6E165033-D866-45CE-B541-828FF044F2FF}"/>
               </a:ext>
             </a:extLst>
           </p:cNvPr>
@@ -2975,7 +2954,7 @@
             </a:lvl1pPr>
           </a:lstStyle>
           <a:p>
-            <a:endParaRPr lang="en-US"/>
+            <a:endParaRPr lang="de-DE"/>
           </a:p>
         </p:txBody>
       </p:sp>
@@ -2984,7 +2963,7 @@
           <p:cNvPr id="6" name="Foliennummernplatzhalter 5">
             <a:extLst>
               <a:ext uri="{FF2B5EF4-FFF2-40B4-BE49-F238E27FC236}">
-                <a16:creationId xmlns:a16="http://schemas.microsoft.com/office/drawing/2014/main" id="{ED19B540-76F8-4F72-A069-40C4A46F22AD}"/>
+                <a16:creationId xmlns:a16="http://schemas.microsoft.com/office/drawing/2014/main" id="{21869234-7CAB-4EDE-A93A-8820E4DC3D27}"/>
               </a:ext>
             </a:extLst>
           </p:cNvPr>
@@ -3018,18 +2997,18 @@
             </a:lvl1pPr>
           </a:lstStyle>
           <a:p>
-            <a:fld id="{7C276BE0-062B-4BA0-AAE5-1A8DABE9CE8D}" type="slidenum">
-              <a:rPr lang="en-US" smtClean="0"/>
+            <a:fld id="{F1B9DB0B-2465-48F5-8C3B-03E86B7C345B}" type="slidenum">
+              <a:rPr lang="de-DE" smtClean="0"/>
               <a:t>‹Nr.›</a:t>
             </a:fld>
-            <a:endParaRPr lang="en-US"/>
+            <a:endParaRPr lang="de-DE"/>
           </a:p>
         </p:txBody>
       </p:sp>
     </p:spTree>
     <p:extLst>
       <p:ext uri="{BB962C8B-B14F-4D97-AF65-F5344CB8AC3E}">
-        <p14:creationId xmlns:p14="http://schemas.microsoft.com/office/powerpoint/2010/main" val="308368115"/>
+        <p14:creationId xmlns:p14="http://schemas.microsoft.com/office/powerpoint/2010/main" val="104284579"/>
       </p:ext>
     </p:extLst>
   </p:cSld>
@@ -3233,7 +3212,7 @@
     </p:bodyStyle>
     <p:otherStyle>
       <a:defPPr>
-        <a:defRPr lang="en-US"/>
+        <a:defRPr lang="de-DE"/>
       </a:defPPr>
       <a:lvl1pPr marL="0" algn="l" defTabSz="914400" rtl="0" eaLnBrk="1" latinLnBrk="0" hangingPunct="1">
         <a:defRPr sz="1800" kern="1200">
@@ -3349,10 +3328,10 @@
       </p:grpSpPr>
       <p:pic>
         <p:nvPicPr>
-          <p:cNvPr id="2" name="Grafik 1">
-            <a:extLst>
-              <a:ext uri="{FF2B5EF4-FFF2-40B4-BE49-F238E27FC236}">
-                <a16:creationId xmlns:a16="http://schemas.microsoft.com/office/drawing/2014/main" id="{791FD66B-9B22-4F8A-AC31-D2E16C22748D}"/>
+          <p:cNvPr id="6" name="Grafik 5">
+            <a:extLst>
+              <a:ext uri="{FF2B5EF4-FFF2-40B4-BE49-F238E27FC236}">
+                <a16:creationId xmlns:a16="http://schemas.microsoft.com/office/drawing/2014/main" id="{98BBE262-B49B-44B7-8FA6-F013F2FD12C3}"/>
               </a:ext>
             </a:extLst>
           </p:cNvPr>
@@ -3369,20 +3348,27 @@
         </p:blipFill>
         <p:spPr>
           <a:xfrm>
-            <a:off x="2973362" y="0"/>
-            <a:ext cx="6354874" cy="6858000"/>
+            <a:off x="1310723" y="0"/>
+            <a:ext cx="5273864" cy="5913120"/>
           </a:xfrm>
           <a:prstGeom prst="rect">
             <a:avLst/>
           </a:prstGeom>
+          <a:effectLst>
+            <a:outerShdw blurRad="50800" dist="38100" dir="2700000" algn="tl" rotWithShape="0">
+              <a:prstClr val="black">
+                <a:alpha val="40000"/>
+              </a:prstClr>
+            </a:outerShdw>
+          </a:effectLst>
         </p:spPr>
       </p:pic>
       <p:sp>
         <p:nvSpPr>
-          <p:cNvPr id="5" name="Rechteck 4">
-            <a:extLst>
-              <a:ext uri="{FF2B5EF4-FFF2-40B4-BE49-F238E27FC236}">
-                <a16:creationId xmlns:a16="http://schemas.microsoft.com/office/drawing/2014/main" id="{6D0CABE3-07DC-4A8A-8726-17020A55EB6C}"/>
+          <p:cNvPr id="7" name="Rechteck 6">
+            <a:extLst>
+              <a:ext uri="{FF2B5EF4-FFF2-40B4-BE49-F238E27FC236}">
+                <a16:creationId xmlns:a16="http://schemas.microsoft.com/office/drawing/2014/main" id="{BDF91724-AC23-4558-B4F5-AA8D541B1A96}"/>
               </a:ext>
             </a:extLst>
           </p:cNvPr>
@@ -3391,21 +3377,28 @@
         </p:nvSpPr>
         <p:spPr>
           <a:xfrm>
-            <a:off x="5294968" y="3912396"/>
-            <a:ext cx="1261145" cy="1737491"/>
+            <a:off x="3319767" y="189539"/>
+            <a:ext cx="571939" cy="252000"/>
           </a:xfrm>
           <a:prstGeom prst="rect">
             <a:avLst/>
           </a:prstGeom>
           <a:noFill/>
-          <a:ln>
+          <a:ln w="12700">
             <a:solidFill>
-              <a:schemeClr val="accent6">
+              <a:schemeClr val="accent1">
                 <a:lumMod val="75000"/>
               </a:schemeClr>
             </a:solidFill>
             <a:prstDash val="sysDash"/>
           </a:ln>
+          <a:effectLst>
+            <a:outerShdw blurRad="50800" dist="38100" dir="2700000" algn="tl" rotWithShape="0">
+              <a:prstClr val="black">
+                <a:alpha val="40000"/>
+              </a:prstClr>
+            </a:outerShdw>
+          </a:effectLst>
         </p:spPr>
         <p:style>
           <a:lnRef idx="2">
@@ -3428,379 +3421,46 @@
           <a:lstStyle/>
           <a:p>
             <a:pPr algn="ctr"/>
-            <a:endParaRPr lang="en-US">
-              <a:solidFill>
-                <a:schemeClr val="accent6">
-                  <a:lumMod val="50000"/>
-                </a:schemeClr>
-              </a:solidFill>
-            </a:endParaRPr>
-          </a:p>
-        </p:txBody>
-      </p:sp>
-      <p:sp>
-        <p:nvSpPr>
-          <p:cNvPr id="6" name="Textfeld 5">
-            <a:extLst>
-              <a:ext uri="{FF2B5EF4-FFF2-40B4-BE49-F238E27FC236}">
-                <a16:creationId xmlns:a16="http://schemas.microsoft.com/office/drawing/2014/main" id="{95354AB4-490E-4AE4-8A50-DF189FBAF4DA}"/>
-              </a:ext>
-            </a:extLst>
-          </p:cNvPr>
-          <p:cNvSpPr txBox="1"/>
+            <a:endParaRPr lang="de-DE"/>
+          </a:p>
+        </p:txBody>
+      </p:sp>
+      <p:sp>
+        <p:nvSpPr>
+          <p:cNvPr id="8" name="Rechteck 7">
+            <a:extLst>
+              <a:ext uri="{FF2B5EF4-FFF2-40B4-BE49-F238E27FC236}">
+                <a16:creationId xmlns:a16="http://schemas.microsoft.com/office/drawing/2014/main" id="{77F3B2C3-03EB-4F95-A718-0535596B4F6E}"/>
+              </a:ext>
+            </a:extLst>
+          </p:cNvPr>
+          <p:cNvSpPr/>
           <p:nvPr/>
         </p:nvSpPr>
         <p:spPr>
           <a:xfrm>
-            <a:off x="6543413" y="4658754"/>
-            <a:ext cx="2004969" cy="1077218"/>
+            <a:off x="3319767" y="3045722"/>
+            <a:ext cx="737616" cy="216000"/>
           </a:xfrm>
           <a:prstGeom prst="rect">
             <a:avLst/>
           </a:prstGeom>
           <a:noFill/>
-          <a:ln>
-            <a:noFill/>
-          </a:ln>
-        </p:spPr>
-        <p:txBody>
-          <a:bodyPr wrap="square" rtlCol="0">
-            <a:spAutoFit/>
-          </a:bodyPr>
-          <a:lstStyle/>
-          <a:p>
-            <a:r>
-              <a:rPr lang="de-DE" sz="1600" dirty="0">
-                <a:solidFill>
-                  <a:schemeClr val="accent6">
-                    <a:lumMod val="50000"/>
-                  </a:schemeClr>
-                </a:solidFill>
-              </a:rPr>
-              <a:t>Data </a:t>
-            </a:r>
-            <a:r>
-              <a:rPr lang="de-DE" sz="1600" dirty="0" err="1">
-                <a:solidFill>
-                  <a:schemeClr val="accent6">
-                    <a:lumMod val="50000"/>
-                  </a:schemeClr>
-                </a:solidFill>
-              </a:rPr>
-              <a:t>which</a:t>
-            </a:r>
-            <a:r>
-              <a:rPr lang="de-DE" sz="1600" dirty="0">
-                <a:solidFill>
-                  <a:schemeClr val="accent6">
-                    <a:lumMod val="50000"/>
-                  </a:schemeClr>
-                </a:solidFill>
-              </a:rPr>
-              <a:t> </a:t>
-            </a:r>
-            <a:r>
-              <a:rPr lang="de-DE" sz="1600" dirty="0" err="1">
-                <a:solidFill>
-                  <a:schemeClr val="accent6">
-                    <a:lumMod val="50000"/>
-                  </a:schemeClr>
-                </a:solidFill>
-              </a:rPr>
-              <a:t>can</a:t>
-            </a:r>
-            <a:r>
-              <a:rPr lang="de-DE" sz="1600" dirty="0">
-                <a:solidFill>
-                  <a:schemeClr val="accent6">
-                    <a:lumMod val="50000"/>
-                  </a:schemeClr>
-                </a:solidFill>
-              </a:rPr>
-              <a:t> </a:t>
-            </a:r>
-            <a:r>
-              <a:rPr lang="de-DE" sz="1600" dirty="0" err="1">
-                <a:solidFill>
-                  <a:schemeClr val="accent6">
-                    <a:lumMod val="50000"/>
-                  </a:schemeClr>
-                </a:solidFill>
-              </a:rPr>
-              <a:t>be</a:t>
-            </a:r>
-            <a:r>
-              <a:rPr lang="de-DE" sz="1600" dirty="0">
-                <a:solidFill>
-                  <a:schemeClr val="accent6">
-                    <a:lumMod val="50000"/>
-                  </a:schemeClr>
-                </a:solidFill>
-              </a:rPr>
-              <a:t> </a:t>
-            </a:r>
-            <a:r>
-              <a:rPr lang="de-DE" sz="1600" dirty="0" err="1">
-                <a:solidFill>
-                  <a:schemeClr val="accent6">
-                    <a:lumMod val="50000"/>
-                  </a:schemeClr>
-                </a:solidFill>
-              </a:rPr>
-              <a:t>used</a:t>
-            </a:r>
-            <a:r>
-              <a:rPr lang="de-DE" sz="1600" dirty="0">
-                <a:solidFill>
-                  <a:schemeClr val="accent6">
-                    <a:lumMod val="50000"/>
-                  </a:schemeClr>
-                </a:solidFill>
-              </a:rPr>
-              <a:t> </a:t>
-            </a:r>
-            <a:r>
-              <a:rPr lang="de-DE" sz="1600" dirty="0" err="1">
-                <a:solidFill>
-                  <a:schemeClr val="accent6">
-                    <a:lumMod val="50000"/>
-                  </a:schemeClr>
-                </a:solidFill>
-              </a:rPr>
-              <a:t>to</a:t>
-            </a:r>
-            <a:r>
-              <a:rPr lang="de-DE" sz="1600" dirty="0">
-                <a:solidFill>
-                  <a:schemeClr val="accent6">
-                    <a:lumMod val="50000"/>
-                  </a:schemeClr>
-                </a:solidFill>
-              </a:rPr>
-              <a:t> </a:t>
-            </a:r>
-            <a:r>
-              <a:rPr lang="de-DE" sz="1600" dirty="0" err="1">
-                <a:solidFill>
-                  <a:schemeClr val="accent6">
-                    <a:lumMod val="50000"/>
-                  </a:schemeClr>
-                </a:solidFill>
-              </a:rPr>
-              <a:t>define</a:t>
-            </a:r>
-            <a:r>
-              <a:rPr lang="de-DE" sz="1600" dirty="0">
-                <a:solidFill>
-                  <a:schemeClr val="accent6">
-                    <a:lumMod val="50000"/>
-                  </a:schemeClr>
-                </a:solidFill>
-              </a:rPr>
-              <a:t> </a:t>
-            </a:r>
-            <a:r>
-              <a:rPr lang="de-DE" sz="1600" i="1" dirty="0" err="1">
-                <a:solidFill>
-                  <a:schemeClr val="accent6">
-                    <a:lumMod val="50000"/>
-                  </a:schemeClr>
-                </a:solidFill>
-              </a:rPr>
-              <a:t>aircraft</a:t>
-            </a:r>
-            <a:r>
-              <a:rPr lang="de-DE" sz="1600" dirty="0">
-                <a:solidFill>
-                  <a:schemeClr val="accent6">
-                    <a:lumMod val="50000"/>
-                  </a:schemeClr>
-                </a:solidFill>
-              </a:rPr>
-              <a:t> </a:t>
-            </a:r>
-            <a:r>
-              <a:rPr lang="de-DE" sz="1600" dirty="0" err="1">
-                <a:solidFill>
-                  <a:schemeClr val="accent6">
-                    <a:lumMod val="50000"/>
-                  </a:schemeClr>
-                </a:solidFill>
-              </a:rPr>
-              <a:t>or</a:t>
-            </a:r>
-            <a:r>
-              <a:rPr lang="de-DE" sz="1600" dirty="0">
-                <a:solidFill>
-                  <a:schemeClr val="accent6">
-                    <a:lumMod val="50000"/>
-                  </a:schemeClr>
-                </a:solidFill>
-              </a:rPr>
-              <a:t> </a:t>
-            </a:r>
-            <a:r>
-              <a:rPr lang="de-DE" sz="1600" i="1" dirty="0" err="1">
-                <a:solidFill>
-                  <a:schemeClr val="accent6">
-                    <a:lumMod val="50000"/>
-                  </a:schemeClr>
-                </a:solidFill>
-              </a:rPr>
-              <a:t>helicopter</a:t>
-            </a:r>
-            <a:r>
-              <a:rPr lang="de-DE" sz="1600" dirty="0">
-                <a:solidFill>
-                  <a:schemeClr val="accent6">
-                    <a:lumMod val="50000"/>
-                  </a:schemeClr>
-                </a:solidFill>
-              </a:rPr>
-              <a:t> (</a:t>
-            </a:r>
-            <a:r>
-              <a:rPr lang="de-DE" sz="1600" dirty="0" err="1">
-                <a:solidFill>
-                  <a:schemeClr val="accent6">
-                    <a:lumMod val="50000"/>
-                  </a:schemeClr>
-                </a:solidFill>
-              </a:rPr>
-              <a:t>library</a:t>
-            </a:r>
-            <a:r>
-              <a:rPr lang="de-DE" sz="1600" dirty="0">
-                <a:solidFill>
-                  <a:schemeClr val="accent6">
-                    <a:lumMod val="50000"/>
-                  </a:schemeClr>
-                </a:solidFill>
-              </a:rPr>
-              <a:t>)</a:t>
-            </a:r>
-            <a:endParaRPr lang="en-US" sz="1600" dirty="0">
-              <a:solidFill>
-                <a:schemeClr val="accent6">
-                  <a:lumMod val="50000"/>
-                </a:schemeClr>
-              </a:solidFill>
-            </a:endParaRPr>
-          </a:p>
-        </p:txBody>
-      </p:sp>
-      <p:sp>
-        <p:nvSpPr>
-          <p:cNvPr id="7" name="Textfeld 6">
-            <a:extLst>
-              <a:ext uri="{FF2B5EF4-FFF2-40B4-BE49-F238E27FC236}">
-                <a16:creationId xmlns:a16="http://schemas.microsoft.com/office/drawing/2014/main" id="{A5055BD2-D772-49DE-81D6-B56C8F8EFA25}"/>
-              </a:ext>
-            </a:extLst>
-          </p:cNvPr>
-          <p:cNvSpPr txBox="1"/>
-          <p:nvPr/>
-        </p:nvSpPr>
-        <p:spPr>
-          <a:xfrm>
-            <a:off x="5512965" y="2202110"/>
-            <a:ext cx="2004969" cy="584775"/>
-          </a:xfrm>
-          <a:prstGeom prst="rect">
-            <a:avLst/>
-          </a:prstGeom>
-          <a:noFill/>
-        </p:spPr>
-        <p:txBody>
-          <a:bodyPr wrap="square" rtlCol="0">
-            <a:spAutoFit/>
-          </a:bodyPr>
-          <a:lstStyle/>
-          <a:p>
-            <a:r>
-              <a:rPr lang="de-DE" sz="1600" dirty="0">
-                <a:solidFill>
-                  <a:schemeClr val="accent1"/>
-                </a:solidFill>
-              </a:rPr>
-              <a:t>The </a:t>
-            </a:r>
-            <a:r>
-              <a:rPr lang="de-DE" sz="1600" dirty="0" err="1">
-                <a:solidFill>
-                  <a:schemeClr val="accent1"/>
-                </a:solidFill>
-              </a:rPr>
-              <a:t>actual</a:t>
-            </a:r>
-            <a:r>
-              <a:rPr lang="de-DE" sz="1600" dirty="0">
-                <a:solidFill>
-                  <a:schemeClr val="accent1"/>
-                </a:solidFill>
-              </a:rPr>
-              <a:t> </a:t>
-            </a:r>
-            <a:r>
-              <a:rPr lang="de-DE" sz="1600" dirty="0" err="1">
-                <a:solidFill>
-                  <a:schemeClr val="accent1"/>
-                </a:solidFill>
-              </a:rPr>
-              <a:t>vehicle</a:t>
-            </a:r>
-            <a:r>
-              <a:rPr lang="de-DE" sz="1600" dirty="0">
-                <a:solidFill>
-                  <a:schemeClr val="accent1"/>
-                </a:solidFill>
-              </a:rPr>
-              <a:t> </a:t>
-            </a:r>
-            <a:r>
-              <a:rPr lang="de-DE" sz="1600" dirty="0" err="1">
-                <a:solidFill>
-                  <a:schemeClr val="accent1"/>
-                </a:solidFill>
-              </a:rPr>
-              <a:t>instances</a:t>
-            </a:r>
-            <a:endParaRPr lang="en-US" sz="1600" dirty="0">
-              <a:solidFill>
-                <a:schemeClr val="accent1"/>
-              </a:solidFill>
-            </a:endParaRPr>
-          </a:p>
-        </p:txBody>
-      </p:sp>
-      <p:sp>
-        <p:nvSpPr>
-          <p:cNvPr id="8" name="Rechteck 7">
-            <a:extLst>
-              <a:ext uri="{FF2B5EF4-FFF2-40B4-BE49-F238E27FC236}">
-                <a16:creationId xmlns:a16="http://schemas.microsoft.com/office/drawing/2014/main" id="{30045FF8-CAA3-4235-93FD-64F31FE567A5}"/>
-              </a:ext>
-            </a:extLst>
-          </p:cNvPr>
-          <p:cNvSpPr/>
-          <p:nvPr/>
-        </p:nvSpPr>
-        <p:spPr>
-          <a:xfrm>
-            <a:off x="5282268" y="230698"/>
-            <a:ext cx="724250" cy="331364"/>
-          </a:xfrm>
-          <a:prstGeom prst="rect">
-            <a:avLst/>
-          </a:prstGeom>
-          <a:noFill/>
-          <a:ln>
+          <a:ln w="12700">
             <a:solidFill>
-              <a:schemeClr val="accent1"/>
+              <a:schemeClr val="accent1">
+                <a:lumMod val="75000"/>
+              </a:schemeClr>
             </a:solidFill>
             <a:prstDash val="sysDash"/>
           </a:ln>
-          <a:effectLst/>
+          <a:effectLst>
+            <a:outerShdw blurRad="50800" dist="38100" dir="2700000" algn="tl" rotWithShape="0">
+              <a:prstClr val="black">
+                <a:alpha val="40000"/>
+              </a:prstClr>
+            </a:outerShdw>
+          </a:effectLst>
         </p:spPr>
         <p:style>
           <a:lnRef idx="2">
@@ -3823,11 +3483,7 @@
           <a:lstStyle/>
           <a:p>
             <a:pPr algn="ctr"/>
-            <a:endParaRPr lang="en-US">
-              <a:solidFill>
-                <a:schemeClr val="accent1"/>
-              </a:solidFill>
-            </a:endParaRPr>
+            <a:endParaRPr lang="de-DE"/>
           </a:p>
         </p:txBody>
       </p:sp>
@@ -3836,7 +3492,7 @@
           <p:cNvPr id="9" name="Rechteck 8">
             <a:extLst>
               <a:ext uri="{FF2B5EF4-FFF2-40B4-BE49-F238E27FC236}">
-                <a16:creationId xmlns:a16="http://schemas.microsoft.com/office/drawing/2014/main" id="{8967988E-FD6A-4FBB-9070-C74E19847DB8}"/>
+                <a16:creationId xmlns:a16="http://schemas.microsoft.com/office/drawing/2014/main" id="{CDA6E4A1-ACBF-4AA6-A259-730E3393FAF8}"/>
               </a:ext>
             </a:extLst>
           </p:cNvPr>
@@ -3845,20 +3501,28 @@
         </p:nvSpPr>
         <p:spPr>
           <a:xfrm>
-            <a:off x="5299046" y="3613917"/>
-            <a:ext cx="796954" cy="294944"/>
+            <a:off x="3313921" y="3268495"/>
+            <a:ext cx="1062213" cy="1655718"/>
           </a:xfrm>
           <a:prstGeom prst="rect">
             <a:avLst/>
           </a:prstGeom>
           <a:noFill/>
-          <a:ln>
+          <a:ln w="12700">
             <a:solidFill>
-              <a:schemeClr val="accent1"/>
+              <a:schemeClr val="accent2">
+                <a:lumMod val="75000"/>
+              </a:schemeClr>
             </a:solidFill>
             <a:prstDash val="sysDash"/>
           </a:ln>
-          <a:effectLst/>
+          <a:effectLst>
+            <a:outerShdw blurRad="50800" dist="38100" dir="2700000" algn="tl" rotWithShape="0">
+              <a:prstClr val="black">
+                <a:alpha val="40000"/>
+              </a:prstClr>
+            </a:outerShdw>
+          </a:effectLst>
         </p:spPr>
         <p:style>
           <a:lnRef idx="2">
@@ -3881,9 +3545,320 @@
           <a:lstStyle/>
           <a:p>
             <a:pPr algn="ctr"/>
-            <a:endParaRPr lang="en-US">
+            <a:endParaRPr lang="de-DE"/>
+          </a:p>
+        </p:txBody>
+      </p:sp>
+      <p:sp>
+        <p:nvSpPr>
+          <p:cNvPr id="10" name="Rechteck 9">
+            <a:extLst>
+              <a:ext uri="{FF2B5EF4-FFF2-40B4-BE49-F238E27FC236}">
+                <a16:creationId xmlns:a16="http://schemas.microsoft.com/office/drawing/2014/main" id="{9897F540-7AF6-427F-88D6-0E9DA03C76DB}"/>
+              </a:ext>
+            </a:extLst>
+          </p:cNvPr>
+          <p:cNvSpPr/>
+          <p:nvPr/>
+        </p:nvSpPr>
+        <p:spPr>
+          <a:xfrm>
+            <a:off x="5296049" y="816609"/>
+            <a:ext cx="1337877" cy="1422000"/>
+          </a:xfrm>
+          <a:prstGeom prst="rect">
+            <a:avLst/>
+          </a:prstGeom>
+          <a:noFill/>
+          <a:ln w="12700">
+            <a:solidFill>
+              <a:schemeClr val="accent1">
+                <a:lumMod val="75000"/>
+              </a:schemeClr>
+            </a:solidFill>
+            <a:prstDash val="sysDash"/>
+          </a:ln>
+          <a:effectLst>
+            <a:outerShdw blurRad="50800" dist="38100" dir="2700000" algn="tl" rotWithShape="0">
+              <a:prstClr val="black">
+                <a:alpha val="40000"/>
+              </a:prstClr>
+            </a:outerShdw>
+          </a:effectLst>
+        </p:spPr>
+        <p:style>
+          <a:lnRef idx="2">
+            <a:schemeClr val="accent1">
+              <a:shade val="50000"/>
+            </a:schemeClr>
+          </a:lnRef>
+          <a:fillRef idx="1">
+            <a:schemeClr val="accent1"/>
+          </a:fillRef>
+          <a:effectRef idx="0">
+            <a:schemeClr val="accent1"/>
+          </a:effectRef>
+          <a:fontRef idx="minor">
+            <a:schemeClr val="lt1"/>
+          </a:fontRef>
+        </p:style>
+        <p:txBody>
+          <a:bodyPr rtlCol="0" anchor="ctr"/>
+          <a:lstStyle/>
+          <a:p>
+            <a:pPr algn="ctr"/>
+            <a:endParaRPr lang="de-DE"/>
+          </a:p>
+        </p:txBody>
+      </p:sp>
+      <p:sp>
+        <p:nvSpPr>
+          <p:cNvPr id="11" name="Rechteck 10">
+            <a:extLst>
+              <a:ext uri="{FF2B5EF4-FFF2-40B4-BE49-F238E27FC236}">
+                <a16:creationId xmlns:a16="http://schemas.microsoft.com/office/drawing/2014/main" id="{3589C860-A76B-4829-8DA0-BF88E4FE746A}"/>
+              </a:ext>
+            </a:extLst>
+          </p:cNvPr>
+          <p:cNvSpPr/>
+          <p:nvPr/>
+        </p:nvSpPr>
+        <p:spPr>
+          <a:xfrm>
+            <a:off x="5296049" y="2254116"/>
+            <a:ext cx="1337877" cy="828000"/>
+          </a:xfrm>
+          <a:prstGeom prst="rect">
+            <a:avLst/>
+          </a:prstGeom>
+          <a:noFill/>
+          <a:ln w="12700">
+            <a:solidFill>
+              <a:schemeClr val="accent6">
+                <a:lumMod val="75000"/>
+              </a:schemeClr>
+            </a:solidFill>
+            <a:prstDash val="sysDash"/>
+          </a:ln>
+          <a:effectLst>
+            <a:outerShdw blurRad="50800" dist="38100" dir="2700000" algn="tl" rotWithShape="0">
+              <a:prstClr val="black">
+                <a:alpha val="40000"/>
+              </a:prstClr>
+            </a:outerShdw>
+          </a:effectLst>
+        </p:spPr>
+        <p:style>
+          <a:lnRef idx="2">
+            <a:schemeClr val="accent1">
+              <a:shade val="50000"/>
+            </a:schemeClr>
+          </a:lnRef>
+          <a:fillRef idx="1">
+            <a:schemeClr val="accent1"/>
+          </a:fillRef>
+          <a:effectRef idx="0">
+            <a:schemeClr val="accent1"/>
+          </a:effectRef>
+          <a:fontRef idx="minor">
+            <a:schemeClr val="lt1"/>
+          </a:fontRef>
+        </p:style>
+        <p:txBody>
+          <a:bodyPr rtlCol="0" anchor="ctr"/>
+          <a:lstStyle/>
+          <a:p>
+            <a:pPr algn="ctr"/>
+            <a:endParaRPr lang="de-DE"/>
+          </a:p>
+        </p:txBody>
+      </p:sp>
+      <p:pic>
+        <p:nvPicPr>
+          <p:cNvPr id="12" name="Picture 19" descr="D:\Arbeit\AircraftConfigurationsPlots\Plots\Mix\eng.png">
+            <a:extLst>
+              <a:ext uri="{FF2B5EF4-FFF2-40B4-BE49-F238E27FC236}">
+                <a16:creationId xmlns:a16="http://schemas.microsoft.com/office/drawing/2014/main" id="{97CDBB39-BCC5-4244-B8D5-351AC5F9B540}"/>
+              </a:ext>
+            </a:extLst>
+          </p:cNvPr>
+          <p:cNvPicPr>
+            <a:picLocks noChangeAspect="1" noChangeArrowheads="1"/>
+          </p:cNvPicPr>
+          <p:nvPr/>
+        </p:nvPicPr>
+        <p:blipFill rotWithShape="1">
+          <a:blip r:embed="rId3" cstate="print">
+            <a:clrChange>
+              <a:clrFrom>
+                <a:srgbClr val="FFFFFF"/>
+              </a:clrFrom>
+              <a:clrTo>
+                <a:srgbClr val="FFFFFF">
+                  <a:alpha val="0"/>
+                </a:srgbClr>
+              </a:clrTo>
+            </a:clrChange>
+            <a:extLst>
+              <a:ext uri="{28A0092B-C50C-407E-A947-70E740481C1C}">
+                <a14:useLocalDpi xmlns:a14="http://schemas.microsoft.com/office/drawing/2010/main" val="0"/>
+              </a:ext>
+            </a:extLst>
+          </a:blip>
+          <a:srcRect l="18399" t="47819" r="52083" b="12052"/>
+          <a:stretch/>
+        </p:blipFill>
+        <p:spPr bwMode="auto">
+          <a:xfrm>
+            <a:off x="3974645" y="3429000"/>
+            <a:ext cx="1062213" cy="812281"/>
+          </a:xfrm>
+          <a:prstGeom prst="rect">
+            <a:avLst/>
+          </a:prstGeom>
+          <a:noFill/>
+          <a:extLst>
+            <a:ext uri="{909E8E84-426E-40DD-AFC4-6F175D3DCCD1}">
+              <a14:hiddenFill xmlns:a14="http://schemas.microsoft.com/office/drawing/2010/main">
+                <a:solidFill>
+                  <a:srgbClr val="FFFFFF"/>
+                </a:solidFill>
+              </a14:hiddenFill>
+            </a:ext>
+          </a:extLst>
+        </p:spPr>
+      </p:pic>
+      <p:pic>
+        <p:nvPicPr>
+          <p:cNvPr id="14" name="Grafik 13">
+            <a:extLst>
+              <a:ext uri="{FF2B5EF4-FFF2-40B4-BE49-F238E27FC236}">
+                <a16:creationId xmlns:a16="http://schemas.microsoft.com/office/drawing/2014/main" id="{5317C093-4259-468B-A37A-343F834988D1}"/>
+              </a:ext>
+            </a:extLst>
+          </p:cNvPr>
+          <p:cNvPicPr>
+            <a:picLocks noChangeAspect="1"/>
+          </p:cNvPicPr>
+          <p:nvPr/>
+        </p:nvPicPr>
+        <p:blipFill>
+          <a:blip r:embed="rId4"/>
+          <a:stretch>
+            <a:fillRect/>
+          </a:stretch>
+        </p:blipFill>
+        <p:spPr>
+          <a:xfrm>
+            <a:off x="6359240" y="1236415"/>
+            <a:ext cx="1337876" cy="752556"/>
+          </a:xfrm>
+          <a:prstGeom prst="rect">
+            <a:avLst/>
+          </a:prstGeom>
+        </p:spPr>
+      </p:pic>
+      <p:pic>
+        <p:nvPicPr>
+          <p:cNvPr id="21" name="Grafik 20">
+            <a:extLst>
+              <a:ext uri="{FF2B5EF4-FFF2-40B4-BE49-F238E27FC236}">
+                <a16:creationId xmlns:a16="http://schemas.microsoft.com/office/drawing/2014/main" id="{CE87F420-4F90-4349-A599-D8EE002C6795}"/>
+              </a:ext>
+            </a:extLst>
+          </p:cNvPr>
+          <p:cNvPicPr>
+            <a:picLocks noChangeAspect="1"/>
+          </p:cNvPicPr>
+          <p:nvPr/>
+        </p:nvPicPr>
+        <p:blipFill>
+          <a:blip r:embed="rId5"/>
+          <a:stretch>
+            <a:fillRect/>
+          </a:stretch>
+        </p:blipFill>
+        <p:spPr>
+          <a:xfrm>
+            <a:off x="6495134" y="2299110"/>
+            <a:ext cx="614506" cy="579092"/>
+          </a:xfrm>
+          <a:prstGeom prst="rect">
+            <a:avLst/>
+          </a:prstGeom>
+          <a:effectLst>
+            <a:outerShdw blurRad="50800" dist="38100" dir="2700000" algn="tl" rotWithShape="0">
+              <a:prstClr val="black">
+                <a:alpha val="40000"/>
+              </a:prstClr>
+            </a:outerShdw>
+          </a:effectLst>
+        </p:spPr>
+      </p:pic>
+      <p:sp>
+        <p:nvSpPr>
+          <p:cNvPr id="22" name="Textfeld 21">
+            <a:extLst>
+              <a:ext uri="{FF2B5EF4-FFF2-40B4-BE49-F238E27FC236}">
+                <a16:creationId xmlns:a16="http://schemas.microsoft.com/office/drawing/2014/main" id="{6E73DE38-E1CD-493E-8821-8B42DBC3A946}"/>
+              </a:ext>
+            </a:extLst>
+          </p:cNvPr>
+          <p:cNvSpPr txBox="1"/>
+          <p:nvPr/>
+        </p:nvSpPr>
+        <p:spPr>
+          <a:xfrm>
+            <a:off x="3524029" y="1625320"/>
+            <a:ext cx="1417889" cy="261610"/>
+          </a:xfrm>
+          <a:prstGeom prst="rect">
+            <a:avLst/>
+          </a:prstGeom>
+          <a:noFill/>
+        </p:spPr>
+        <p:txBody>
+          <a:bodyPr wrap="square" rtlCol="0">
+            <a:spAutoFit/>
+          </a:bodyPr>
+          <a:lstStyle/>
+          <a:p>
+            <a:pPr algn="ctr"/>
+            <a:r>
+              <a:rPr lang="de-DE" sz="1100" dirty="0" err="1">
+                <a:solidFill>
+                  <a:schemeClr val="accent1">
+                    <a:lumMod val="75000"/>
+                  </a:schemeClr>
+                </a:solidFill>
+              </a:rPr>
+              <a:t>vehicle</a:t>
+            </a:r>
+            <a:r>
+              <a:rPr lang="de-DE" sz="1100" dirty="0">
+                <a:solidFill>
+                  <a:schemeClr val="accent1">
+                    <a:lumMod val="75000"/>
+                  </a:schemeClr>
+                </a:solidFill>
+              </a:rPr>
+              <a:t> </a:t>
+            </a:r>
+            <a:r>
+              <a:rPr lang="de-DE" sz="1100" dirty="0" err="1">
+                <a:solidFill>
+                  <a:schemeClr val="accent1">
+                    <a:lumMod val="75000"/>
+                  </a:schemeClr>
+                </a:solidFill>
+              </a:rPr>
+              <a:t>instances</a:t>
+            </a:r>
+            <a:endParaRPr lang="de-DE" sz="1100" dirty="0">
               <a:solidFill>
-                <a:schemeClr val="accent1"/>
+                <a:schemeClr val="accent1">
+                  <a:lumMod val="75000"/>
+                </a:schemeClr>
               </a:solidFill>
             </a:endParaRPr>
           </a:p>
@@ -3891,27 +3866,34 @@
       </p:sp>
       <p:cxnSp>
         <p:nvCxnSpPr>
-          <p:cNvPr id="11" name="Gerader Verbinder 10">
-            <a:extLst>
-              <a:ext uri="{FF2B5EF4-FFF2-40B4-BE49-F238E27FC236}">
-                <a16:creationId xmlns:a16="http://schemas.microsoft.com/office/drawing/2014/main" id="{FAD7050B-68CB-4916-B3BE-294D2620F76A}"/>
+          <p:cNvPr id="24" name="Gerader Verbinder 23">
+            <a:extLst>
+              <a:ext uri="{FF2B5EF4-FFF2-40B4-BE49-F238E27FC236}">
+                <a16:creationId xmlns:a16="http://schemas.microsoft.com/office/drawing/2014/main" id="{2778952C-6073-4700-A0DA-8B05F9EA3AD1}"/>
               </a:ext>
             </a:extLst>
           </p:cNvPr>
           <p:cNvCxnSpPr>
             <a:cxnSpLocks/>
-            <a:endCxn id="9" idx="0"/>
+            <a:endCxn id="22" idx="0"/>
           </p:cNvCxnSpPr>
           <p:nvPr/>
         </p:nvCxnSpPr>
         <p:spPr>
-          <a:xfrm flipH="1">
-            <a:off x="5697523" y="2786885"/>
-            <a:ext cx="216716" cy="827032"/>
+          <a:xfrm>
+            <a:off x="3763358" y="441539"/>
+            <a:ext cx="469616" cy="1183781"/>
           </a:xfrm>
           <a:prstGeom prst="line">
             <a:avLst/>
           </a:prstGeom>
+          <a:effectLst>
+            <a:outerShdw blurRad="50800" dist="38100" dir="5400000" algn="t" rotWithShape="0">
+              <a:prstClr val="black">
+                <a:alpha val="40000"/>
+              </a:prstClr>
+            </a:outerShdw>
+          </a:effectLst>
         </p:spPr>
         <p:style>
           <a:lnRef idx="1">
@@ -3930,27 +3912,34 @@
       </p:cxnSp>
       <p:cxnSp>
         <p:nvCxnSpPr>
-          <p:cNvPr id="13" name="Gerader Verbinder 12">
-            <a:extLst>
-              <a:ext uri="{FF2B5EF4-FFF2-40B4-BE49-F238E27FC236}">
-                <a16:creationId xmlns:a16="http://schemas.microsoft.com/office/drawing/2014/main" id="{C7B7D252-D90E-46CE-B2BB-195E4C4498B2}"/>
+          <p:cNvPr id="25" name="Gerader Verbinder 24">
+            <a:extLst>
+              <a:ext uri="{FF2B5EF4-FFF2-40B4-BE49-F238E27FC236}">
+                <a16:creationId xmlns:a16="http://schemas.microsoft.com/office/drawing/2014/main" id="{E8F2AC42-40DA-467B-B4E2-E2F02B8BC9CD}"/>
               </a:ext>
             </a:extLst>
           </p:cNvPr>
           <p:cNvCxnSpPr>
             <a:cxnSpLocks/>
-            <a:endCxn id="8" idx="2"/>
+            <a:endCxn id="22" idx="2"/>
           </p:cNvCxnSpPr>
           <p:nvPr/>
         </p:nvCxnSpPr>
         <p:spPr>
-          <a:xfrm flipH="1" flipV="1">
-            <a:off x="5644393" y="562062"/>
-            <a:ext cx="269846" cy="1640048"/>
+          <a:xfrm flipV="1">
+            <a:off x="3880275" y="1886930"/>
+            <a:ext cx="352699" cy="1158792"/>
           </a:xfrm>
           <a:prstGeom prst="line">
             <a:avLst/>
           </a:prstGeom>
+          <a:effectLst>
+            <a:outerShdw blurRad="50800" dist="38100" dir="5400000" algn="t" rotWithShape="0">
+              <a:prstClr val="black">
+                <a:alpha val="40000"/>
+              </a:prstClr>
+            </a:outerShdw>
+          </a:effectLst>
         </p:spPr>
         <p:style>
           <a:lnRef idx="1">
@@ -3969,69 +3958,101 @@
       </p:cxnSp>
       <p:sp>
         <p:nvSpPr>
-          <p:cNvPr id="16" name="Rechteck 15">
-            <a:extLst>
-              <a:ext uri="{FF2B5EF4-FFF2-40B4-BE49-F238E27FC236}">
-                <a16:creationId xmlns:a16="http://schemas.microsoft.com/office/drawing/2014/main" id="{56F31BFD-AF62-444C-B3C8-EEA3DC8A46E2}"/>
-              </a:ext>
-            </a:extLst>
-          </p:cNvPr>
-          <p:cNvSpPr/>
+          <p:cNvPr id="28" name="Textfeld 27">
+            <a:extLst>
+              <a:ext uri="{FF2B5EF4-FFF2-40B4-BE49-F238E27FC236}">
+                <a16:creationId xmlns:a16="http://schemas.microsoft.com/office/drawing/2014/main" id="{468AC091-B9D2-4CEC-A017-581AA91C0FD6}"/>
+              </a:ext>
+            </a:extLst>
+          </p:cNvPr>
+          <p:cNvSpPr txBox="1"/>
           <p:nvPr/>
         </p:nvSpPr>
         <p:spPr>
           <a:xfrm>
-            <a:off x="7622939" y="969928"/>
-            <a:ext cx="1697911" cy="1711360"/>
+            <a:off x="3221799" y="4911850"/>
+            <a:ext cx="1632178" cy="261610"/>
           </a:xfrm>
           <a:prstGeom prst="rect">
             <a:avLst/>
           </a:prstGeom>
           <a:noFill/>
-          <a:ln>
-            <a:solidFill>
-              <a:schemeClr val="accent1"/>
-            </a:solidFill>
-            <a:prstDash val="sysDash"/>
-          </a:ln>
         </p:spPr>
-        <p:style>
-          <a:lnRef idx="2">
-            <a:schemeClr val="accent1">
-              <a:shade val="50000"/>
-            </a:schemeClr>
-          </a:lnRef>
-          <a:fillRef idx="1">
-            <a:schemeClr val="accent1"/>
-          </a:fillRef>
-          <a:effectRef idx="0">
-            <a:schemeClr val="accent1"/>
-          </a:effectRef>
-          <a:fontRef idx="minor">
-            <a:schemeClr val="lt1"/>
-          </a:fontRef>
-        </p:style>
-        <p:txBody>
-          <a:bodyPr rtlCol="0" anchor="ctr"/>
-          <a:lstStyle/>
-          <a:p>
-            <a:pPr algn="ctr"/>
-            <a:endParaRPr lang="en-US">
-              <a:solidFill>
-                <a:schemeClr val="accent6">
-                  <a:lumMod val="50000"/>
-                </a:schemeClr>
-              </a:solidFill>
-            </a:endParaRPr>
-          </a:p>
-        </p:txBody>
-      </p:sp>
-      <p:sp>
-        <p:nvSpPr>
-          <p:cNvPr id="17" name="Textfeld 16">
-            <a:extLst>
-              <a:ext uri="{FF2B5EF4-FFF2-40B4-BE49-F238E27FC236}">
-                <a16:creationId xmlns:a16="http://schemas.microsoft.com/office/drawing/2014/main" id="{7D3F595B-8852-4218-963C-573F091340A5}"/>
+        <p:txBody>
+          <a:bodyPr wrap="none" rtlCol="0">
+            <a:spAutoFit/>
+          </a:bodyPr>
+          <a:lstStyle/>
+          <a:p>
+            <a:r>
+              <a:rPr lang="de-DE" sz="1100" dirty="0" err="1">
+                <a:solidFill>
+                  <a:schemeClr val="accent2">
+                    <a:lumMod val="75000"/>
+                  </a:schemeClr>
+                </a:solidFill>
+              </a:rPr>
+              <a:t>Pre-defined</a:t>
+            </a:r>
+            <a:r>
+              <a:rPr lang="de-DE" sz="1100" dirty="0">
+                <a:solidFill>
+                  <a:schemeClr val="accent2">
+                    <a:lumMod val="75000"/>
+                  </a:schemeClr>
+                </a:solidFill>
+              </a:rPr>
+              <a:t> </a:t>
+            </a:r>
+            <a:r>
+              <a:rPr lang="de-DE" sz="1100" dirty="0" err="1">
+                <a:solidFill>
+                  <a:schemeClr val="accent2">
+                    <a:lumMod val="75000"/>
+                  </a:schemeClr>
+                </a:solidFill>
+              </a:rPr>
+              <a:t>data</a:t>
+            </a:r>
+            <a:r>
+              <a:rPr lang="de-DE" sz="1100" dirty="0">
+                <a:solidFill>
+                  <a:schemeClr val="accent2">
+                    <a:lumMod val="75000"/>
+                  </a:schemeClr>
+                </a:solidFill>
+              </a:rPr>
+              <a:t> (</a:t>
+            </a:r>
+            <a:r>
+              <a:rPr lang="de-DE" sz="1100" dirty="0" err="1">
+                <a:solidFill>
+                  <a:schemeClr val="accent2">
+                    <a:lumMod val="75000"/>
+                  </a:schemeClr>
+                </a:solidFill>
+              </a:rPr>
+              <a:t>library</a:t>
+            </a:r>
+            <a:r>
+              <a:rPr lang="de-DE" sz="1100" dirty="0">
+                <a:solidFill>
+                  <a:schemeClr val="accent2">
+                    <a:lumMod val="75000"/>
+                  </a:schemeClr>
+                </a:solidFill>
+              </a:rPr>
+              <a:t>)</a:t>
+            </a:r>
+          </a:p>
+        </p:txBody>
+      </p:sp>
+      <p:sp>
+        <p:nvSpPr>
+          <p:cNvPr id="29" name="Textfeld 28">
+            <a:extLst>
+              <a:ext uri="{FF2B5EF4-FFF2-40B4-BE49-F238E27FC236}">
+                <a16:creationId xmlns:a16="http://schemas.microsoft.com/office/drawing/2014/main" id="{E795B25F-26F7-4E56-80D9-D88B2123A7A6}"/>
               </a:ext>
             </a:extLst>
           </p:cNvPr>
@@ -4040,16 +4061,13 @@
         </p:nvSpPr>
         <p:spPr>
           <a:xfrm>
-            <a:off x="9382765" y="1089698"/>
-            <a:ext cx="1455811" cy="584775"/>
+            <a:off x="6640950" y="737828"/>
+            <a:ext cx="1337877" cy="430887"/>
           </a:xfrm>
           <a:prstGeom prst="rect">
             <a:avLst/>
           </a:prstGeom>
           <a:noFill/>
-          <a:ln>
-            <a:noFill/>
-          </a:ln>
         </p:spPr>
         <p:txBody>
           <a:bodyPr wrap="square" rtlCol="0">
@@ -4058,32 +4076,40 @@
           <a:lstStyle/>
           <a:p>
             <a:r>
-              <a:rPr lang="de-DE" sz="1600" dirty="0" err="1">
+              <a:rPr lang="de-DE" sz="1100" dirty="0" err="1">
                 <a:solidFill>
-                  <a:schemeClr val="accent1"/>
+                  <a:schemeClr val="accent1">
+                    <a:lumMod val="75000"/>
+                  </a:schemeClr>
                 </a:solidFill>
               </a:rPr>
               <a:t>Component</a:t>
             </a:r>
             <a:r>
-              <a:rPr lang="de-DE" sz="1600" dirty="0">
+              <a:rPr lang="de-DE" sz="1100" dirty="0">
                 <a:solidFill>
-                  <a:schemeClr val="accent1"/>
+                  <a:schemeClr val="accent1">
+                    <a:lumMod val="75000"/>
+                  </a:schemeClr>
                 </a:solidFill>
               </a:rPr>
               <a:t> </a:t>
             </a:r>
             <a:r>
-              <a:rPr lang="de-DE" sz="1600" dirty="0" err="1">
+              <a:rPr lang="de-DE" sz="1100" dirty="0" err="1">
                 <a:solidFill>
-                  <a:schemeClr val="accent1"/>
+                  <a:schemeClr val="accent1">
+                    <a:lumMod val="75000"/>
+                  </a:schemeClr>
                 </a:solidFill>
               </a:rPr>
-              <a:t>level</a:t>
-            </a:r>
-            <a:endParaRPr lang="en-US" sz="1600" dirty="0">
+              <a:t>assemblies</a:t>
+            </a:r>
+            <a:endParaRPr lang="de-DE" sz="1100" dirty="0">
               <a:solidFill>
-                <a:schemeClr val="accent1"/>
+                <a:schemeClr val="accent1">
+                  <a:lumMod val="75000"/>
+                </a:schemeClr>
               </a:solidFill>
             </a:endParaRPr>
           </a:p>
@@ -4091,10 +4117,10 @@
       </p:sp>
       <p:sp>
         <p:nvSpPr>
-          <p:cNvPr id="18" name="Textfeld 17">
-            <a:extLst>
-              <a:ext uri="{FF2B5EF4-FFF2-40B4-BE49-F238E27FC236}">
-                <a16:creationId xmlns:a16="http://schemas.microsoft.com/office/drawing/2014/main" id="{F966E041-8A15-4500-8757-A63D33A8F1D9}"/>
+          <p:cNvPr id="30" name="Textfeld 29">
+            <a:extLst>
+              <a:ext uri="{FF2B5EF4-FFF2-40B4-BE49-F238E27FC236}">
+                <a16:creationId xmlns:a16="http://schemas.microsoft.com/office/drawing/2014/main" id="{032BCC46-07D6-48B2-810B-A00636F1BB41}"/>
               </a:ext>
             </a:extLst>
           </p:cNvPr>
@@ -4103,16 +4129,13 @@
         </p:nvSpPr>
         <p:spPr>
           <a:xfrm>
-            <a:off x="9354481" y="2919896"/>
-            <a:ext cx="1604554" cy="830997"/>
+            <a:off x="5213957" y="3092782"/>
+            <a:ext cx="1895683" cy="430887"/>
           </a:xfrm>
           <a:prstGeom prst="rect">
             <a:avLst/>
           </a:prstGeom>
           <a:noFill/>
-          <a:ln>
-            <a:noFill/>
-          </a:ln>
         </p:spPr>
         <p:txBody>
           <a:bodyPr wrap="square" rtlCol="0">
@@ -4121,160 +4144,79 @@
           <a:lstStyle/>
           <a:p>
             <a:r>
-              <a:rPr lang="de-DE" sz="1600" dirty="0">
+              <a:rPr lang="de-DE" sz="1100" dirty="0">
                 <a:solidFill>
                   <a:schemeClr val="accent6">
-                    <a:lumMod val="50000"/>
+                    <a:lumMod val="75000"/>
                   </a:schemeClr>
                 </a:solidFill>
               </a:rPr>
-              <a:t>Further </a:t>
-            </a:r>
-            <a:r>
-              <a:rPr lang="de-DE" sz="1600" dirty="0" err="1">
+              <a:t>Additional </a:t>
+            </a:r>
+            <a:r>
+              <a:rPr lang="de-DE" sz="1100" dirty="0" err="1">
                 <a:solidFill>
                   <a:schemeClr val="accent6">
-                    <a:lumMod val="50000"/>
+                    <a:lumMod val="75000"/>
                   </a:schemeClr>
                 </a:solidFill>
               </a:rPr>
               <a:t>information</a:t>
             </a:r>
             <a:r>
-              <a:rPr lang="de-DE" sz="1600" dirty="0">
+              <a:rPr lang="de-DE" sz="1100" dirty="0">
                 <a:solidFill>
                   <a:schemeClr val="accent6">
-                    <a:lumMod val="50000"/>
+                    <a:lumMod val="75000"/>
+                  </a:schemeClr>
+                </a:solidFill>
+              </a:rPr>
+              <a:t> &amp; </a:t>
+            </a:r>
+            <a:r>
+              <a:rPr lang="de-DE" sz="1100" dirty="0" err="1">
+                <a:solidFill>
+                  <a:schemeClr val="accent6">
+                    <a:lumMod val="75000"/>
+                  </a:schemeClr>
+                </a:solidFill>
+              </a:rPr>
+              <a:t>analyses</a:t>
+            </a:r>
+            <a:r>
+              <a:rPr lang="de-DE" sz="1100" dirty="0">
+                <a:solidFill>
+                  <a:schemeClr val="accent6">
+                    <a:lumMod val="75000"/>
                   </a:schemeClr>
                 </a:solidFill>
               </a:rPr>
               <a:t> </a:t>
             </a:r>
             <a:r>
-              <a:rPr lang="de-DE" sz="1600" dirty="0" err="1">
+              <a:rPr lang="de-DE" sz="1100" dirty="0" err="1">
                 <a:solidFill>
                   <a:schemeClr val="accent6">
-                    <a:lumMod val="50000"/>
+                    <a:lumMod val="75000"/>
                   </a:schemeClr>
                 </a:solidFill>
               </a:rPr>
-              <a:t>about</a:t>
-            </a:r>
-            <a:r>
-              <a:rPr lang="de-DE" sz="1600" dirty="0">
-                <a:solidFill>
-                  <a:schemeClr val="accent6">
-                    <a:lumMod val="50000"/>
-                  </a:schemeClr>
-                </a:solidFill>
-              </a:rPr>
-              <a:t> </a:t>
-            </a:r>
-            <a:r>
-              <a:rPr lang="de-DE" sz="1600" dirty="0" err="1">
-                <a:solidFill>
-                  <a:schemeClr val="accent6">
-                    <a:lumMod val="50000"/>
-                  </a:schemeClr>
-                </a:solidFill>
-              </a:rPr>
-              <a:t>this</a:t>
-            </a:r>
-            <a:r>
-              <a:rPr lang="de-DE" sz="1600" dirty="0">
-                <a:solidFill>
-                  <a:schemeClr val="accent6">
-                    <a:lumMod val="50000"/>
-                  </a:schemeClr>
-                </a:solidFill>
-              </a:rPr>
-              <a:t> </a:t>
-            </a:r>
-            <a:r>
-              <a:rPr lang="de-DE" sz="1600" i="1" dirty="0" err="1">
-                <a:solidFill>
-                  <a:schemeClr val="accent6">
-                    <a:lumMod val="50000"/>
-                  </a:schemeClr>
-                </a:solidFill>
-              </a:rPr>
-              <a:t>model</a:t>
-            </a:r>
-            <a:endParaRPr lang="en-US" sz="1600" dirty="0">
+              <a:t>results</a:t>
+            </a:r>
+            <a:endParaRPr lang="de-DE" sz="1100" dirty="0">
               <a:solidFill>
                 <a:schemeClr val="accent6">
-                  <a:lumMod val="50000"/>
+                  <a:lumMod val="75000"/>
                 </a:schemeClr>
               </a:solidFill>
             </a:endParaRPr>
           </a:p>
         </p:txBody>
       </p:sp>
-      <p:sp>
-        <p:nvSpPr>
-          <p:cNvPr id="19" name="Rechteck 18">
-            <a:extLst>
-              <a:ext uri="{FF2B5EF4-FFF2-40B4-BE49-F238E27FC236}">
-                <a16:creationId xmlns:a16="http://schemas.microsoft.com/office/drawing/2014/main" id="{CEE00ABD-FB8B-4278-A771-84BB20292995}"/>
-              </a:ext>
-            </a:extLst>
-          </p:cNvPr>
-          <p:cNvSpPr/>
-          <p:nvPr/>
-        </p:nvSpPr>
-        <p:spPr>
-          <a:xfrm>
-            <a:off x="7622939" y="2695577"/>
-            <a:ext cx="1697911" cy="995836"/>
-          </a:xfrm>
-          <a:prstGeom prst="rect">
-            <a:avLst/>
-          </a:prstGeom>
-          <a:noFill/>
-          <a:ln>
-            <a:solidFill>
-              <a:schemeClr val="accent6">
-                <a:lumMod val="75000"/>
-              </a:schemeClr>
-            </a:solidFill>
-            <a:prstDash val="sysDash"/>
-          </a:ln>
-        </p:spPr>
-        <p:style>
-          <a:lnRef idx="2">
-            <a:schemeClr val="accent1">
-              <a:shade val="50000"/>
-            </a:schemeClr>
-          </a:lnRef>
-          <a:fillRef idx="1">
-            <a:schemeClr val="accent1"/>
-          </a:fillRef>
-          <a:effectRef idx="0">
-            <a:schemeClr val="accent1"/>
-          </a:effectRef>
-          <a:fontRef idx="minor">
-            <a:schemeClr val="lt1"/>
-          </a:fontRef>
-        </p:style>
-        <p:txBody>
-          <a:bodyPr rtlCol="0" anchor="ctr"/>
-          <a:lstStyle/>
-          <a:p>
-            <a:pPr algn="ctr"/>
-            <a:endParaRPr lang="en-US">
-              <a:solidFill>
-                <a:schemeClr val="accent6">
-                  <a:lumMod val="50000"/>
-                </a:schemeClr>
-              </a:solidFill>
-            </a:endParaRPr>
-          </a:p>
-        </p:txBody>
-      </p:sp>
     </p:spTree>
     <p:extLst>
       <p:ext uri="{BB962C8B-B14F-4D97-AF65-F5344CB8AC3E}">
-        <p14:creationId xmlns:p14="http://schemas.microsoft.com/office/powerpoint/2010/main" val="2496283084"/>
+        <p14:creationId xmlns:p14="http://schemas.microsoft.com/office/powerpoint/2010/main" val="370490202"/>
       </p:ext>
     </p:extLst>
   </p:cSld>

</xml_diff>